<commit_message>
Updating for final submission
Created graph image for XGBoost tree, finished final powerpoint, created some other images, updated the Laptop Pricing Model notebook for more detail and cluster understanding
</commit_message>
<xml_diff>
--- a/reports and metrics/Laptop_Capstone_Presentation.pptx
+++ b/reports and metrics/Laptop_Capstone_Presentation.pptx
@@ -7,18 +7,20 @@
   <p:sldIdLst>
     <p:sldId id="256" r:id="rId2"/>
     <p:sldId id="257" r:id="rId3"/>
-    <p:sldId id="258" r:id="rId4"/>
-    <p:sldId id="259" r:id="rId5"/>
-    <p:sldId id="260" r:id="rId6"/>
-    <p:sldId id="261" r:id="rId7"/>
-    <p:sldId id="262" r:id="rId8"/>
-    <p:sldId id="263" r:id="rId9"/>
-    <p:sldId id="264" r:id="rId10"/>
-    <p:sldId id="265" r:id="rId11"/>
-    <p:sldId id="266" r:id="rId12"/>
-    <p:sldId id="267" r:id="rId13"/>
-    <p:sldId id="268" r:id="rId14"/>
-    <p:sldId id="269" r:id="rId15"/>
+    <p:sldId id="271" r:id="rId4"/>
+    <p:sldId id="258" r:id="rId5"/>
+    <p:sldId id="259" r:id="rId6"/>
+    <p:sldId id="260" r:id="rId7"/>
+    <p:sldId id="261" r:id="rId8"/>
+    <p:sldId id="262" r:id="rId9"/>
+    <p:sldId id="270" r:id="rId10"/>
+    <p:sldId id="263" r:id="rId11"/>
+    <p:sldId id="264" r:id="rId12"/>
+    <p:sldId id="265" r:id="rId13"/>
+    <p:sldId id="267" r:id="rId14"/>
+    <p:sldId id="272" r:id="rId15"/>
+    <p:sldId id="268" r:id="rId16"/>
+    <p:sldId id="273" r:id="rId17"/>
   </p:sldIdLst>
   <p:sldSz cx="12192000" cy="6858000"/>
   <p:notesSz cx="6858000" cy="9144000"/>
@@ -117,6 +119,11 @@
       </a:defRPr>
     </a:lvl9pPr>
   </p:defaultTextStyle>
+  <p:extLst>
+    <p:ext uri="{EFAFB233-063F-42B5-8137-9DF3F51BA10A}">
+      <p15:sldGuideLst xmlns:p15="http://schemas.microsoft.com/office/powerpoint/2012/main"/>
+    </p:ext>
+  </p:extLst>
 </p:presentation>
 </file>
 
@@ -6150,7 +6157,7 @@
         </p:nvSpPr>
         <p:spPr>
           <a:xfrm>
-            <a:off x="5524241" y="3520858"/>
+            <a:off x="5524241" y="4136679"/>
             <a:ext cx="4689669" cy="1306071"/>
           </a:xfrm>
         </p:spPr>
@@ -6241,7 +6248,7 @@
           <a:p>
             <a:r>
               <a:rPr lang="en-US" dirty="0"/>
-              <a:t>Model Decision – K-prototypes w/ XGBoost Knowledge</a:t>
+              <a:t>Model 2 – Isomapping</a:t>
             </a:r>
           </a:p>
         </p:txBody>
@@ -6262,19 +6269,63 @@
             <p:ph idx="1"/>
           </p:nvPr>
         </p:nvSpPr>
-        <p:spPr/>
+        <p:spPr>
+          <a:xfrm>
+            <a:off x="646111" y="1371614"/>
+            <a:ext cx="10247748" cy="4195481"/>
+          </a:xfrm>
+        </p:spPr>
         <p:txBody>
           <a:bodyPr/>
           <a:lstStyle/>
           <a:p>
-            <a:endParaRPr lang="en-US"/>
-          </a:p>
-        </p:txBody>
-      </p:sp>
+            <a:r>
+              <a:rPr lang="en-US" dirty="0"/>
+              <a:t>Ultimately, difficult to discern</a:t>
+            </a:r>
+          </a:p>
+          <a:p>
+            <a:r>
+              <a:rPr lang="en-US" dirty="0"/>
+              <a:t>Overlapping components without a way to understand the eigenvalues</a:t>
+            </a:r>
+          </a:p>
+        </p:txBody>
+      </p:sp>
+      <p:pic>
+        <p:nvPicPr>
+          <p:cNvPr id="5" name="Picture 4">
+            <a:extLst>
+              <a:ext uri="{FF2B5EF4-FFF2-40B4-BE49-F238E27FC236}">
+                <a16:creationId xmlns:a16="http://schemas.microsoft.com/office/drawing/2014/main" id="{5098D6FC-0C8A-3373-3F52-8A41C829A613}"/>
+              </a:ext>
+            </a:extLst>
+          </p:cNvPr>
+          <p:cNvPicPr>
+            <a:picLocks noChangeAspect="1"/>
+          </p:cNvPicPr>
+          <p:nvPr/>
+        </p:nvPicPr>
+        <p:blipFill>
+          <a:blip r:embed="rId2"/>
+          <a:stretch>
+            <a:fillRect/>
+          </a:stretch>
+        </p:blipFill>
+        <p:spPr>
+          <a:xfrm>
+            <a:off x="2674793" y="2192149"/>
+            <a:ext cx="5347357" cy="4566282"/>
+          </a:xfrm>
+          <a:prstGeom prst="rect">
+            <a:avLst/>
+          </a:prstGeom>
+        </p:spPr>
+      </p:pic>
     </p:spTree>
     <p:extLst>
       <p:ext uri="{BB962C8B-B14F-4D97-AF65-F5344CB8AC3E}">
-        <p14:creationId xmlns:p14="http://schemas.microsoft.com/office/powerpoint/2010/main" val="2497328494"/>
+        <p14:creationId xmlns:p14="http://schemas.microsoft.com/office/powerpoint/2010/main" val="1346287030"/>
       </p:ext>
     </p:extLst>
   </p:cSld>
@@ -6317,47 +6368,366 @@
             <p:ph type="title"/>
           </p:nvPr>
         </p:nvSpPr>
-        <p:spPr/>
+        <p:spPr>
+          <a:xfrm>
+            <a:off x="341317" y="246922"/>
+            <a:ext cx="9404723" cy="1400530"/>
+          </a:xfrm>
+        </p:spPr>
         <p:txBody>
           <a:bodyPr/>
           <a:lstStyle/>
           <a:p>
             <a:r>
               <a:rPr lang="en-US" dirty="0"/>
-              <a:t>Cluster Visualization</a:t>
-            </a:r>
-          </a:p>
-        </p:txBody>
-      </p:sp>
-      <p:sp>
-        <p:nvSpPr>
-          <p:cNvPr id="3" name="Content Placeholder 2">
+              <a:t>Model 3 – XGBoost</a:t>
+            </a:r>
+          </a:p>
+        </p:txBody>
+      </p:sp>
+      <p:pic>
+        <p:nvPicPr>
+          <p:cNvPr id="5" name="Content Placeholder 4" descr="Diagram&#10;&#10;Description automatically generated">
             <a:extLst>
               <a:ext uri="{FF2B5EF4-FFF2-40B4-BE49-F238E27FC236}">
-                <a16:creationId xmlns:a16="http://schemas.microsoft.com/office/drawing/2014/main" id="{584909B6-33B3-D639-50BB-FB628C77A894}"/>
+                <a16:creationId xmlns:a16="http://schemas.microsoft.com/office/drawing/2014/main" id="{BBDDED81-7882-ACC8-AF3F-36E82ACD44E9}"/>
               </a:ext>
             </a:extLst>
           </p:cNvPr>
-          <p:cNvSpPr>
-            <a:spLocks noGrp="1"/>
-          </p:cNvSpPr>
+          <p:cNvPicPr>
+            <a:picLocks noGrp="1" noChangeAspect="1"/>
+          </p:cNvPicPr>
           <p:nvPr>
             <p:ph idx="1"/>
           </p:nvPr>
-        </p:nvSpPr>
-        <p:spPr/>
-        <p:txBody>
-          <a:bodyPr/>
-          <a:lstStyle/>
-          <a:p>
-            <a:endParaRPr lang="en-US"/>
-          </a:p>
-        </p:txBody>
-      </p:sp>
+        </p:nvPicPr>
+        <p:blipFill>
+          <a:blip r:embed="rId2">
+            <a:extLst>
+              <a:ext uri="{28A0092B-C50C-407E-A947-70E740481C1C}">
+                <a14:useLocalDpi xmlns:a14="http://schemas.microsoft.com/office/drawing/2010/main" val="0"/>
+              </a:ext>
+            </a:extLst>
+          </a:blip>
+          <a:stretch>
+            <a:fillRect/>
+          </a:stretch>
+        </p:blipFill>
+        <p:spPr>
+          <a:xfrm>
+            <a:off x="341317" y="3790555"/>
+            <a:ext cx="4944903" cy="2505640"/>
+          </a:xfrm>
+        </p:spPr>
+      </p:pic>
+      <p:sp>
+        <p:nvSpPr>
+          <p:cNvPr id="8" name="Content Placeholder 2">
+            <a:extLst>
+              <a:ext uri="{FF2B5EF4-FFF2-40B4-BE49-F238E27FC236}">
+                <a16:creationId xmlns:a16="http://schemas.microsoft.com/office/drawing/2014/main" id="{4D64CA12-EFAB-9FCC-5363-AB1EC7845328}"/>
+              </a:ext>
+            </a:extLst>
+          </p:cNvPr>
+          <p:cNvSpPr txBox="1">
+            <a:spLocks/>
+          </p:cNvSpPr>
+          <p:nvPr/>
+        </p:nvSpPr>
+        <p:spPr>
+          <a:xfrm>
+            <a:off x="288690" y="1199997"/>
+            <a:ext cx="4651702" cy="4195481"/>
+          </a:xfrm>
+          <a:prstGeom prst="rect">
+            <a:avLst/>
+          </a:prstGeom>
+        </p:spPr>
+        <p:txBody>
+          <a:bodyPr vert="horz" lIns="91440" tIns="45720" rIns="91440" bIns="45720" rtlCol="0">
+            <a:normAutofit/>
+          </a:bodyPr>
+          <a:lstStyle>
+            <a:lvl1pPr marL="342900" indent="-342900" algn="l" defTabSz="457200" rtl="0" eaLnBrk="1" latinLnBrk="0" hangingPunct="1">
+              <a:spcBef>
+                <a:spcPts val="1000"/>
+              </a:spcBef>
+              <a:spcAft>
+                <a:spcPts val="0"/>
+              </a:spcAft>
+              <a:buClr>
+                <a:schemeClr val="bg2">
+                  <a:lumMod val="40000"/>
+                  <a:lumOff val="60000"/>
+                </a:schemeClr>
+              </a:buClr>
+              <a:buSzPct val="80000"/>
+              <a:buFont typeface="Wingdings 3" charset="2"/>
+              <a:buChar char=""/>
+              <a:defRPr sz="2000" b="0" i="0" kern="1200">
+                <a:solidFill>
+                  <a:schemeClr val="tx1"/>
+                </a:solidFill>
+                <a:latin typeface="+mj-lt"/>
+                <a:ea typeface="+mj-ea"/>
+                <a:cs typeface="+mj-cs"/>
+              </a:defRPr>
+            </a:lvl1pPr>
+            <a:lvl2pPr marL="742950" indent="-285750" algn="l" defTabSz="457200" rtl="0" eaLnBrk="1" latinLnBrk="0" hangingPunct="1">
+              <a:spcBef>
+                <a:spcPts val="1000"/>
+              </a:spcBef>
+              <a:spcAft>
+                <a:spcPts val="0"/>
+              </a:spcAft>
+              <a:buClr>
+                <a:schemeClr val="bg2">
+                  <a:lumMod val="40000"/>
+                  <a:lumOff val="60000"/>
+                </a:schemeClr>
+              </a:buClr>
+              <a:buSzPct val="80000"/>
+              <a:buFont typeface="Wingdings 3" charset="2"/>
+              <a:buChar char=""/>
+              <a:defRPr sz="1800" b="0" i="0" kern="1200">
+                <a:solidFill>
+                  <a:schemeClr val="tx1"/>
+                </a:solidFill>
+                <a:latin typeface="+mj-lt"/>
+                <a:ea typeface="+mj-ea"/>
+                <a:cs typeface="+mj-cs"/>
+              </a:defRPr>
+            </a:lvl2pPr>
+            <a:lvl3pPr marL="1143000" indent="-228600" algn="l" defTabSz="457200" rtl="0" eaLnBrk="1" latinLnBrk="0" hangingPunct="1">
+              <a:spcBef>
+                <a:spcPts val="1000"/>
+              </a:spcBef>
+              <a:spcAft>
+                <a:spcPts val="0"/>
+              </a:spcAft>
+              <a:buClr>
+                <a:schemeClr val="bg2">
+                  <a:lumMod val="40000"/>
+                  <a:lumOff val="60000"/>
+                </a:schemeClr>
+              </a:buClr>
+              <a:buSzPct val="80000"/>
+              <a:buFont typeface="Wingdings 3" charset="2"/>
+              <a:buChar char=""/>
+              <a:defRPr sz="1600" b="0" i="0" kern="1200">
+                <a:solidFill>
+                  <a:schemeClr val="tx1"/>
+                </a:solidFill>
+                <a:latin typeface="+mj-lt"/>
+                <a:ea typeface="+mj-ea"/>
+                <a:cs typeface="+mj-cs"/>
+              </a:defRPr>
+            </a:lvl3pPr>
+            <a:lvl4pPr marL="1600200" indent="-228600" algn="l" defTabSz="457200" rtl="0" eaLnBrk="1" latinLnBrk="0" hangingPunct="1">
+              <a:spcBef>
+                <a:spcPts val="1000"/>
+              </a:spcBef>
+              <a:spcAft>
+                <a:spcPts val="0"/>
+              </a:spcAft>
+              <a:buClr>
+                <a:schemeClr val="bg2">
+                  <a:lumMod val="40000"/>
+                  <a:lumOff val="60000"/>
+                </a:schemeClr>
+              </a:buClr>
+              <a:buSzPct val="80000"/>
+              <a:buFont typeface="Wingdings 3" charset="2"/>
+              <a:buChar char=""/>
+              <a:defRPr sz="1400" b="0" i="0" kern="1200">
+                <a:solidFill>
+                  <a:schemeClr val="tx1"/>
+                </a:solidFill>
+                <a:latin typeface="+mj-lt"/>
+                <a:ea typeface="+mj-ea"/>
+                <a:cs typeface="+mj-cs"/>
+              </a:defRPr>
+            </a:lvl4pPr>
+            <a:lvl5pPr marL="2057400" indent="-228600" algn="l" defTabSz="457200" rtl="0" eaLnBrk="1" latinLnBrk="0" hangingPunct="1">
+              <a:spcBef>
+                <a:spcPts val="1000"/>
+              </a:spcBef>
+              <a:spcAft>
+                <a:spcPts val="0"/>
+              </a:spcAft>
+              <a:buClr>
+                <a:schemeClr val="bg2">
+                  <a:lumMod val="40000"/>
+                  <a:lumOff val="60000"/>
+                </a:schemeClr>
+              </a:buClr>
+              <a:buSzPct val="80000"/>
+              <a:buFont typeface="Wingdings 3" charset="2"/>
+              <a:buChar char=""/>
+              <a:defRPr sz="1400" b="0" i="0" kern="1200">
+                <a:solidFill>
+                  <a:schemeClr val="tx1"/>
+                </a:solidFill>
+                <a:latin typeface="+mj-lt"/>
+                <a:ea typeface="+mj-ea"/>
+                <a:cs typeface="+mj-cs"/>
+              </a:defRPr>
+            </a:lvl5pPr>
+            <a:lvl6pPr marL="2506000" indent="-228600" algn="l" defTabSz="457200" rtl="0" eaLnBrk="1" latinLnBrk="0" hangingPunct="1">
+              <a:spcBef>
+                <a:spcPts val="1000"/>
+              </a:spcBef>
+              <a:spcAft>
+                <a:spcPts val="0"/>
+              </a:spcAft>
+              <a:buClr>
+                <a:schemeClr val="bg2">
+                  <a:lumMod val="40000"/>
+                  <a:lumOff val="60000"/>
+                </a:schemeClr>
+              </a:buClr>
+              <a:buSzPct val="80000"/>
+              <a:buFont typeface="Wingdings 3" charset="2"/>
+              <a:buChar char=""/>
+              <a:defRPr sz="1400" b="0" i="0" kern="1200">
+                <a:solidFill>
+                  <a:schemeClr val="tx1"/>
+                </a:solidFill>
+                <a:latin typeface="+mj-lt"/>
+                <a:ea typeface="+mj-ea"/>
+                <a:cs typeface="+mj-cs"/>
+              </a:defRPr>
+            </a:lvl6pPr>
+            <a:lvl7pPr marL="2971800" indent="-228600" algn="l" defTabSz="457200" rtl="0" eaLnBrk="1" latinLnBrk="0" hangingPunct="1">
+              <a:spcBef>
+                <a:spcPts val="1000"/>
+              </a:spcBef>
+              <a:spcAft>
+                <a:spcPts val="0"/>
+              </a:spcAft>
+              <a:buClr>
+                <a:schemeClr val="bg2">
+                  <a:lumMod val="40000"/>
+                  <a:lumOff val="60000"/>
+                </a:schemeClr>
+              </a:buClr>
+              <a:buSzPct val="80000"/>
+              <a:buFont typeface="Wingdings 3" charset="2"/>
+              <a:buChar char=""/>
+              <a:defRPr sz="1400" b="0" i="0" kern="1200">
+                <a:solidFill>
+                  <a:schemeClr val="tx1"/>
+                </a:solidFill>
+                <a:latin typeface="+mj-lt"/>
+                <a:ea typeface="+mj-ea"/>
+                <a:cs typeface="+mj-cs"/>
+              </a:defRPr>
+            </a:lvl7pPr>
+            <a:lvl8pPr marL="3429000" indent="-228600" algn="l" defTabSz="457200" rtl="0" eaLnBrk="1" latinLnBrk="0" hangingPunct="1">
+              <a:spcBef>
+                <a:spcPts val="1000"/>
+              </a:spcBef>
+              <a:spcAft>
+                <a:spcPts val="0"/>
+              </a:spcAft>
+              <a:buClr>
+                <a:schemeClr val="bg2">
+                  <a:lumMod val="40000"/>
+                  <a:lumOff val="60000"/>
+                </a:schemeClr>
+              </a:buClr>
+              <a:buSzPct val="80000"/>
+              <a:buFont typeface="Wingdings 3" charset="2"/>
+              <a:buChar char=""/>
+              <a:defRPr sz="1400" b="0" i="0" kern="1200">
+                <a:solidFill>
+                  <a:schemeClr val="tx1"/>
+                </a:solidFill>
+                <a:latin typeface="+mj-lt"/>
+                <a:ea typeface="+mj-ea"/>
+                <a:cs typeface="+mj-cs"/>
+              </a:defRPr>
+            </a:lvl8pPr>
+            <a:lvl9pPr marL="3886200" indent="-228600" algn="l" defTabSz="457200" rtl="0" eaLnBrk="1" latinLnBrk="0" hangingPunct="1">
+              <a:spcBef>
+                <a:spcPts val="1000"/>
+              </a:spcBef>
+              <a:spcAft>
+                <a:spcPts val="0"/>
+              </a:spcAft>
+              <a:buClr>
+                <a:schemeClr val="bg2">
+                  <a:lumMod val="40000"/>
+                  <a:lumOff val="60000"/>
+                </a:schemeClr>
+              </a:buClr>
+              <a:buSzPct val="80000"/>
+              <a:buFont typeface="Wingdings 3" charset="2"/>
+              <a:buChar char=""/>
+              <a:defRPr sz="1400" b="0" i="0" kern="1200">
+                <a:solidFill>
+                  <a:schemeClr val="tx1"/>
+                </a:solidFill>
+                <a:latin typeface="+mj-lt"/>
+                <a:ea typeface="+mj-ea"/>
+                <a:cs typeface="+mj-cs"/>
+              </a:defRPr>
+            </a:lvl9pPr>
+          </a:lstStyle>
+          <a:p>
+            <a:r>
+              <a:rPr lang="en-US" dirty="0"/>
+              <a:t>Great for understanding classification</a:t>
+            </a:r>
+          </a:p>
+          <a:p>
+            <a:r>
+              <a:rPr lang="en-US" dirty="0"/>
+              <a:t>Gave good understanding of features</a:t>
+            </a:r>
+          </a:p>
+          <a:p>
+            <a:r>
+              <a:rPr lang="en-US" dirty="0"/>
+              <a:t>Helped show important features for classification model</a:t>
+            </a:r>
+          </a:p>
+        </p:txBody>
+      </p:sp>
+      <p:pic>
+        <p:nvPicPr>
+          <p:cNvPr id="10" name="Picture 9">
+            <a:extLst>
+              <a:ext uri="{FF2B5EF4-FFF2-40B4-BE49-F238E27FC236}">
+                <a16:creationId xmlns:a16="http://schemas.microsoft.com/office/drawing/2014/main" id="{1864C953-76D6-7796-16EF-858C4714EAEB}"/>
+              </a:ext>
+            </a:extLst>
+          </p:cNvPr>
+          <p:cNvPicPr>
+            <a:picLocks noChangeAspect="1"/>
+          </p:cNvPicPr>
+          <p:nvPr/>
+        </p:nvPicPr>
+        <p:blipFill>
+          <a:blip r:embed="rId3"/>
+          <a:stretch>
+            <a:fillRect/>
+          </a:stretch>
+        </p:blipFill>
+        <p:spPr>
+          <a:xfrm>
+            <a:off x="5830928" y="1474952"/>
+            <a:ext cx="6072382" cy="4636398"/>
+          </a:xfrm>
+          <a:prstGeom prst="rect">
+            <a:avLst/>
+          </a:prstGeom>
+        </p:spPr>
+      </p:pic>
     </p:spTree>
     <p:extLst>
       <p:ext uri="{BB962C8B-B14F-4D97-AF65-F5344CB8AC3E}">
-        <p14:creationId xmlns:p14="http://schemas.microsoft.com/office/powerpoint/2010/main" val="57905918"/>
+        <p14:creationId xmlns:p14="http://schemas.microsoft.com/office/powerpoint/2010/main" val="248949725"/>
       </p:ext>
     </p:extLst>
   </p:cSld>
@@ -6407,7 +6777,7 @@
           <a:p>
             <a:r>
               <a:rPr lang="en-US" dirty="0"/>
-              <a:t>Recommended Action</a:t>
+              <a:t>Model Decision – K-prototypes w/ XGBoost Knowledge</a:t>
             </a:r>
           </a:p>
         </p:txBody>
@@ -6433,14 +6803,44 @@
           <a:bodyPr/>
           <a:lstStyle/>
           <a:p>
-            <a:endParaRPr lang="en-US"/>
+            <a:r>
+              <a:rPr lang="en-US" dirty="0"/>
+              <a:t>K-Prototypes gives easy to understand clusters</a:t>
+            </a:r>
+          </a:p>
+          <a:p>
+            <a:r>
+              <a:rPr lang="en-US" dirty="0"/>
+              <a:t>XGBoost gives great delineation between certain features </a:t>
+            </a:r>
+          </a:p>
+          <a:p>
+            <a:pPr lvl="1"/>
+            <a:r>
+              <a:rPr lang="en-US" dirty="0" err="1"/>
+              <a:t>e.g</a:t>
+            </a:r>
+            <a:r>
+              <a:rPr lang="en-US" dirty="0"/>
+              <a:t> if SSD above 770GB we can be confident the price should be in a higher classification group</a:t>
+            </a:r>
+          </a:p>
+          <a:p>
+            <a:r>
+              <a:rPr lang="en-US" dirty="0"/>
+              <a:t>No one model was immediately the best</a:t>
+            </a:r>
+          </a:p>
+          <a:p>
+            <a:pPr lvl="1"/>
+            <a:endParaRPr lang="en-US" dirty="0"/>
           </a:p>
         </p:txBody>
       </p:sp>
     </p:spTree>
     <p:extLst>
       <p:ext uri="{BB962C8B-B14F-4D97-AF65-F5344CB8AC3E}">
-        <p14:creationId xmlns:p14="http://schemas.microsoft.com/office/powerpoint/2010/main" val="1447502435"/>
+        <p14:creationId xmlns:p14="http://schemas.microsoft.com/office/powerpoint/2010/main" val="2497328494"/>
       </p:ext>
     </p:extLst>
   </p:cSld>
@@ -6490,7 +6890,7 @@
           <a:p>
             <a:r>
               <a:rPr lang="en-US" dirty="0"/>
-              <a:t>Further Study</a:t>
+              <a:t>Recommended Action</a:t>
             </a:r>
           </a:p>
         </p:txBody>
@@ -6511,19 +6911,53 @@
             <p:ph idx="1"/>
           </p:nvPr>
         </p:nvSpPr>
-        <p:spPr/>
+        <p:spPr>
+          <a:xfrm>
+            <a:off x="736307" y="1623710"/>
+            <a:ext cx="8946541" cy="4195481"/>
+          </a:xfrm>
+        </p:spPr>
         <p:txBody>
           <a:bodyPr/>
           <a:lstStyle/>
           <a:p>
-            <a:endParaRPr lang="en-US"/>
+            <a:r>
+              <a:rPr lang="en-US" dirty="0"/>
+              <a:t>Use the K-</a:t>
+            </a:r>
+            <a:r>
+              <a:rPr lang="en-US" dirty="0" err="1"/>
+              <a:t>protoypes</a:t>
+            </a:r>
+            <a:r>
+              <a:rPr lang="en-US" dirty="0"/>
+              <a:t> clusters as a starting point for pricing</a:t>
+            </a:r>
+          </a:p>
+          <a:p>
+            <a:r>
+              <a:rPr lang="en-US" dirty="0"/>
+              <a:t>Use XGBoost tree for understanding exactly which price range it should fall in -&gt; can label a laptop based on inputted specifications</a:t>
+            </a:r>
+          </a:p>
+          <a:p>
+            <a:r>
+              <a:rPr lang="en-US" dirty="0"/>
+              <a:t>Focus on developing graphics card memory size, SSD size, display size, and providing warranties</a:t>
+            </a:r>
+          </a:p>
+          <a:p>
+            <a:r>
+              <a:rPr lang="en-US" dirty="0"/>
+              <a:t>These are the main ways to optimize our pricing strategy</a:t>
+            </a:r>
           </a:p>
         </p:txBody>
       </p:sp>
     </p:spTree>
     <p:extLst>
       <p:ext uri="{BB962C8B-B14F-4D97-AF65-F5344CB8AC3E}">
-        <p14:creationId xmlns:p14="http://schemas.microsoft.com/office/powerpoint/2010/main" val="3476287372"/>
+        <p14:creationId xmlns:p14="http://schemas.microsoft.com/office/powerpoint/2010/main" val="1447502435"/>
       </p:ext>
     </p:extLst>
   </p:cSld>
@@ -6573,7 +7007,7 @@
           <a:p>
             <a:r>
               <a:rPr lang="en-US" dirty="0"/>
-              <a:t>Credits</a:t>
+              <a:t>Constraints and Limitations</a:t>
             </a:r>
           </a:p>
         </p:txBody>
@@ -6594,19 +7028,286 @@
             <p:ph idx="1"/>
           </p:nvPr>
         </p:nvSpPr>
-        <p:spPr/>
+        <p:spPr>
+          <a:xfrm>
+            <a:off x="646111" y="1513041"/>
+            <a:ext cx="8946541" cy="4195481"/>
+          </a:xfrm>
+        </p:spPr>
         <p:txBody>
           <a:bodyPr/>
           <a:lstStyle/>
           <a:p>
-            <a:endParaRPr lang="en-US"/>
+            <a:r>
+              <a:rPr lang="en-US" dirty="0"/>
+              <a:t>Initially missing a lot of data (almost 33%)</a:t>
+            </a:r>
+          </a:p>
+          <a:p>
+            <a:r>
+              <a:rPr lang="en-US" dirty="0"/>
+              <a:t>Assuming that all features are weighed the same</a:t>
+            </a:r>
+          </a:p>
+          <a:p>
+            <a:r>
+              <a:rPr lang="en-US" dirty="0"/>
+              <a:t>Relatively small dataset compared to the volume of laptops available</a:t>
+            </a:r>
+          </a:p>
+          <a:p>
+            <a:r>
+              <a:rPr lang="en-US" dirty="0"/>
+              <a:t>Potentially could become outdated without updated laptop information</a:t>
+            </a:r>
           </a:p>
         </p:txBody>
       </p:sp>
     </p:spTree>
     <p:extLst>
       <p:ext uri="{BB962C8B-B14F-4D97-AF65-F5344CB8AC3E}">
-        <p14:creationId xmlns:p14="http://schemas.microsoft.com/office/powerpoint/2010/main" val="4146948701"/>
+        <p14:creationId xmlns:p14="http://schemas.microsoft.com/office/powerpoint/2010/main" val="286266346"/>
+      </p:ext>
+    </p:extLst>
+  </p:cSld>
+  <p:clrMapOvr>
+    <a:masterClrMapping/>
+  </p:clrMapOvr>
+</p:sld>
+</file>
+
+<file path=ppt/slides/slide15.xml><?xml version="1.0" encoding="utf-8"?>
+<p:sld xmlns:a="http://schemas.openxmlformats.org/drawingml/2006/main" xmlns:r="http://schemas.openxmlformats.org/officeDocument/2006/relationships" xmlns:p="http://schemas.openxmlformats.org/presentationml/2006/main">
+  <p:cSld>
+    <p:spTree>
+      <p:nvGrpSpPr>
+        <p:cNvPr id="1" name=""/>
+        <p:cNvGrpSpPr/>
+        <p:nvPr/>
+      </p:nvGrpSpPr>
+      <p:grpSpPr>
+        <a:xfrm>
+          <a:off x="0" y="0"/>
+          <a:ext cx="0" cy="0"/>
+          <a:chOff x="0" y="0"/>
+          <a:chExt cx="0" cy="0"/>
+        </a:xfrm>
+      </p:grpSpPr>
+      <p:sp>
+        <p:nvSpPr>
+          <p:cNvPr id="2" name="Title 1">
+            <a:extLst>
+              <a:ext uri="{FF2B5EF4-FFF2-40B4-BE49-F238E27FC236}">
+                <a16:creationId xmlns:a16="http://schemas.microsoft.com/office/drawing/2014/main" id="{D86DE1B0-5B88-5CDE-5369-8F4650A49A28}"/>
+              </a:ext>
+            </a:extLst>
+          </p:cNvPr>
+          <p:cNvSpPr>
+            <a:spLocks noGrp="1"/>
+          </p:cNvSpPr>
+          <p:nvPr>
+            <p:ph type="title"/>
+          </p:nvPr>
+        </p:nvSpPr>
+        <p:spPr/>
+        <p:txBody>
+          <a:bodyPr/>
+          <a:lstStyle/>
+          <a:p>
+            <a:r>
+              <a:rPr lang="en-US" dirty="0"/>
+              <a:t>Further Study</a:t>
+            </a:r>
+          </a:p>
+        </p:txBody>
+      </p:sp>
+      <p:sp>
+        <p:nvSpPr>
+          <p:cNvPr id="3" name="Content Placeholder 2">
+            <a:extLst>
+              <a:ext uri="{FF2B5EF4-FFF2-40B4-BE49-F238E27FC236}">
+                <a16:creationId xmlns:a16="http://schemas.microsoft.com/office/drawing/2014/main" id="{584909B6-33B3-D639-50BB-FB628C77A894}"/>
+              </a:ext>
+            </a:extLst>
+          </p:cNvPr>
+          <p:cNvSpPr>
+            <a:spLocks noGrp="1"/>
+          </p:cNvSpPr>
+          <p:nvPr>
+            <p:ph idx="1"/>
+          </p:nvPr>
+        </p:nvSpPr>
+        <p:spPr>
+          <a:xfrm>
+            <a:off x="646111" y="1276665"/>
+            <a:ext cx="8946541" cy="4195481"/>
+          </a:xfrm>
+        </p:spPr>
+        <p:txBody>
+          <a:bodyPr/>
+          <a:lstStyle/>
+          <a:p>
+            <a:r>
+              <a:rPr lang="en-US" dirty="0"/>
+              <a:t>Gather more laptop data </a:t>
+            </a:r>
+          </a:p>
+          <a:p>
+            <a:r>
+              <a:rPr lang="en-US" dirty="0"/>
+              <a:t>Improve the decision tree modeling to increase accuracy</a:t>
+            </a:r>
+          </a:p>
+          <a:p>
+            <a:r>
+              <a:rPr lang="en-US" dirty="0"/>
+              <a:t>Get fewer missing data points with less imputing to minimize bias</a:t>
+            </a:r>
+          </a:p>
+          <a:p>
+            <a:r>
+              <a:rPr lang="en-US" dirty="0"/>
+              <a:t>Gather consumer data and apply weighting to our data points</a:t>
+            </a:r>
+          </a:p>
+          <a:p>
+            <a:r>
+              <a:rPr lang="en-US" dirty="0"/>
+              <a:t>Combine with NLP to understand what consumers are saying about laptops and what they feel are important features</a:t>
+            </a:r>
+          </a:p>
+        </p:txBody>
+      </p:sp>
+    </p:spTree>
+    <p:extLst>
+      <p:ext uri="{BB962C8B-B14F-4D97-AF65-F5344CB8AC3E}">
+        <p14:creationId xmlns:p14="http://schemas.microsoft.com/office/powerpoint/2010/main" val="3476287372"/>
+      </p:ext>
+    </p:extLst>
+  </p:cSld>
+  <p:clrMapOvr>
+    <a:masterClrMapping/>
+  </p:clrMapOvr>
+</p:sld>
+</file>
+
+<file path=ppt/slides/slide16.xml><?xml version="1.0" encoding="utf-8"?>
+<p:sld xmlns:a="http://schemas.openxmlformats.org/drawingml/2006/main" xmlns:r="http://schemas.openxmlformats.org/officeDocument/2006/relationships" xmlns:p="http://schemas.openxmlformats.org/presentationml/2006/main">
+  <p:cSld>
+    <p:spTree>
+      <p:nvGrpSpPr>
+        <p:cNvPr id="1" name=""/>
+        <p:cNvGrpSpPr/>
+        <p:nvPr/>
+      </p:nvGrpSpPr>
+      <p:grpSpPr>
+        <a:xfrm>
+          <a:off x="0" y="0"/>
+          <a:ext cx="0" cy="0"/>
+          <a:chOff x="0" y="0"/>
+          <a:chExt cx="0" cy="0"/>
+        </a:xfrm>
+      </p:grpSpPr>
+      <p:sp>
+        <p:nvSpPr>
+          <p:cNvPr id="2" name="Title 1">
+            <a:extLst>
+              <a:ext uri="{FF2B5EF4-FFF2-40B4-BE49-F238E27FC236}">
+                <a16:creationId xmlns:a16="http://schemas.microsoft.com/office/drawing/2014/main" id="{DB8DDEFC-20B1-3D43-C522-4BD6471F095F}"/>
+              </a:ext>
+            </a:extLst>
+          </p:cNvPr>
+          <p:cNvSpPr>
+            <a:spLocks noGrp="1"/>
+          </p:cNvSpPr>
+          <p:nvPr>
+            <p:ph type="ctrTitle"/>
+          </p:nvPr>
+        </p:nvSpPr>
+        <p:spPr>
+          <a:xfrm>
+            <a:off x="1074090" y="2407298"/>
+            <a:ext cx="8825658" cy="1338112"/>
+          </a:xfrm>
+        </p:spPr>
+        <p:txBody>
+          <a:bodyPr/>
+          <a:lstStyle/>
+          <a:p>
+            <a:pPr algn="ctr"/>
+            <a:r>
+              <a:rPr lang="en-US" dirty="0"/>
+              <a:t>Thank you</a:t>
+            </a:r>
+          </a:p>
+        </p:txBody>
+      </p:sp>
+      <p:sp>
+        <p:nvSpPr>
+          <p:cNvPr id="3" name="Subtitle 2">
+            <a:extLst>
+              <a:ext uri="{FF2B5EF4-FFF2-40B4-BE49-F238E27FC236}">
+                <a16:creationId xmlns:a16="http://schemas.microsoft.com/office/drawing/2014/main" id="{1D51DFE9-F71A-4B25-3CF7-0268F32419D6}"/>
+              </a:ext>
+            </a:extLst>
+          </p:cNvPr>
+          <p:cNvSpPr>
+            <a:spLocks noGrp="1"/>
+          </p:cNvSpPr>
+          <p:nvPr>
+            <p:ph type="subTitle" idx="1"/>
+          </p:nvPr>
+        </p:nvSpPr>
+        <p:spPr/>
+        <p:txBody>
+          <a:bodyPr>
+            <a:normAutofit fontScale="40000" lnSpcReduction="20000"/>
+          </a:bodyPr>
+          <a:lstStyle/>
+          <a:p>
+            <a:r>
+              <a:rPr lang="en-US" dirty="0"/>
+              <a:t>Timothy Lu</a:t>
+            </a:r>
+          </a:p>
+          <a:p>
+            <a:r>
+              <a:rPr lang="en-US" dirty="0"/>
+              <a:t>Project Report: </a:t>
+            </a:r>
+            <a:r>
+              <a:rPr lang="en-US" dirty="0">
+                <a:hlinkClick r:id="rId2"/>
+              </a:rPr>
+              <a:t>https://github.com/naturesbless/LaptopPriceModeling/blob/main/reports%20and%20metrics/Laptop_Price_Modeling_Capstone_Report.pdf</a:t>
+            </a:r>
+            <a:r>
+              <a:rPr lang="en-US" dirty="0"/>
+              <a:t> </a:t>
+            </a:r>
+          </a:p>
+          <a:p>
+            <a:r>
+              <a:rPr lang="en-US" dirty="0"/>
+              <a:t>Project Github: </a:t>
+            </a:r>
+            <a:r>
+              <a:rPr lang="en-US" dirty="0">
+                <a:hlinkClick r:id="rId3"/>
+              </a:rPr>
+              <a:t>https://github.com/naturesbless/LaptopPriceModeling</a:t>
+            </a:r>
+            <a:r>
+              <a:rPr lang="en-US" dirty="0"/>
+              <a:t> </a:t>
+            </a:r>
+          </a:p>
+        </p:txBody>
+      </p:sp>
+    </p:spTree>
+    <p:extLst>
+      <p:ext uri="{BB962C8B-B14F-4D97-AF65-F5344CB8AC3E}">
+        <p14:creationId xmlns:p14="http://schemas.microsoft.com/office/powerpoint/2010/main" val="2050771344"/>
       </p:ext>
     </p:extLst>
   </p:cSld>
@@ -6651,7 +7352,7 @@
         </p:nvSpPr>
         <p:spPr>
           <a:xfrm>
-            <a:off x="695873" y="214098"/>
+            <a:off x="714534" y="214098"/>
             <a:ext cx="8222397" cy="467544"/>
           </a:xfrm>
         </p:spPr>
@@ -6660,8 +7361,8 @@
           <a:lstStyle/>
           <a:p>
             <a:r>
-              <a:rPr lang="en-US" sz="2400" dirty="0"/>
-              <a:t>Problem Statement Worksheet</a:t>
+              <a:rPr lang="en-US" sz="2400" u="sng" dirty="0"/>
+              <a:t>Capstone Goal:</a:t>
             </a:r>
           </a:p>
         </p:txBody>
@@ -6680,8 +7381,8 @@
         </p:nvSpPr>
         <p:spPr>
           <a:xfrm>
-            <a:off x="695873" y="609601"/>
-            <a:ext cx="9057727" cy="1200329"/>
+            <a:off x="714534" y="914991"/>
+            <a:ext cx="4479507" cy="1569660"/>
           </a:xfrm>
           <a:prstGeom prst="rect">
             <a:avLst/>
@@ -6703,23 +7404,85 @@
               </a:spcAft>
             </a:pPr>
             <a:r>
-              <a:rPr lang="en-US" sz="1200" b="1" i="0" u="none" strike="noStrike" dirty="0">
+              <a:rPr lang="en-US" sz="1200" b="1" dirty="0">
                 <a:solidFill>
                   <a:schemeClr val="tx2"/>
                 </a:solidFill>
-                <a:effectLst/>
                 <a:latin typeface="Arial" panose="020B0604020202020204" pitchFamily="34" charset="0"/>
               </a:rPr>
-              <a:t>Big Mountain Resort should look to increase profits to at least offset the additional cost of the new lift. To do so, Big Mountain Resort should look to increase its chairlift ticket pricing in comparison to other resorts with a similar number of runs, chairs, and skiable area. By understanding the market value of similar resorts, Big Mountain can position itself in a place where its value is optimal instead of basing it on the entire market’s average.</a:t>
-            </a:r>
-            <a:endParaRPr lang="en-US" sz="1200" b="0" dirty="0">
+              <a:t>Consumer demand for laptops is increasing</a:t>
+            </a:r>
+          </a:p>
+          <a:p>
+            <a:pPr rtl="0">
+              <a:spcBef>
+                <a:spcPts val="0"/>
+              </a:spcBef>
+              <a:spcAft>
+                <a:spcPts val="0"/>
+              </a:spcAft>
+            </a:pPr>
+            <a:endParaRPr lang="en-US" sz="1200" b="1" dirty="0">
               <a:solidFill>
                 <a:schemeClr val="tx2"/>
               </a:solidFill>
               <a:effectLst/>
+              <a:latin typeface="Arial" panose="020B0604020202020204" pitchFamily="34" charset="0"/>
             </a:endParaRPr>
           </a:p>
           <a:p>
+            <a:pPr rtl="0">
+              <a:spcBef>
+                <a:spcPts val="0"/>
+              </a:spcBef>
+              <a:spcAft>
+                <a:spcPts val="0"/>
+              </a:spcAft>
+            </a:pPr>
+            <a:r>
+              <a:rPr lang="en-US" sz="1200" b="1" dirty="0">
+                <a:solidFill>
+                  <a:schemeClr val="tx2"/>
+                </a:solidFill>
+                <a:latin typeface="Arial" panose="020B0604020202020204" pitchFamily="34" charset="0"/>
+              </a:rPr>
+              <a:t>Laptop companies need to understand what features to focus on in order to optimize their pricing strategy</a:t>
+            </a:r>
+          </a:p>
+          <a:p>
+            <a:pPr rtl="0">
+              <a:spcBef>
+                <a:spcPts val="0"/>
+              </a:spcBef>
+              <a:spcAft>
+                <a:spcPts val="0"/>
+              </a:spcAft>
+            </a:pPr>
+            <a:endParaRPr lang="en-US" sz="1200" b="1" dirty="0">
+              <a:solidFill>
+                <a:schemeClr val="tx2"/>
+              </a:solidFill>
+              <a:latin typeface="Arial" panose="020B0604020202020204" pitchFamily="34" charset="0"/>
+            </a:endParaRPr>
+          </a:p>
+          <a:p>
+            <a:pPr rtl="0">
+              <a:spcBef>
+                <a:spcPts val="0"/>
+              </a:spcBef>
+              <a:spcAft>
+                <a:spcPts val="0"/>
+              </a:spcAft>
+            </a:pPr>
+            <a:r>
+              <a:rPr lang="en-US" sz="1200" b="1" dirty="0">
+                <a:solidFill>
+                  <a:schemeClr val="tx2"/>
+                </a:solidFill>
+                <a:latin typeface="Arial" panose="020B0604020202020204" pitchFamily="34" charset="0"/>
+              </a:rPr>
+              <a:t>Having inappropriately price products can either cause decreased sales or missed profit </a:t>
+            </a:r>
             <a:br>
               <a:rPr lang="en-US" sz="1200" dirty="0"/>
             </a:br>
@@ -6729,10 +7492,10 @@
       </p:sp>
       <p:sp>
         <p:nvSpPr>
-          <p:cNvPr id="12" name="TextBox 11">
+          <p:cNvPr id="6" name="TextBox 5">
             <a:extLst>
               <a:ext uri="{FF2B5EF4-FFF2-40B4-BE49-F238E27FC236}">
-                <a16:creationId xmlns:a16="http://schemas.microsoft.com/office/drawing/2014/main" id="{29672B27-CF83-5D4F-A9F3-08027DB2578B}"/>
+                <a16:creationId xmlns:a16="http://schemas.microsoft.com/office/drawing/2014/main" id="{AEA5C00D-3926-6B51-1EBF-C8A1055E4D30}"/>
               </a:ext>
             </a:extLst>
           </p:cNvPr>
@@ -6741,8 +7504,8 @@
         </p:nvSpPr>
         <p:spPr>
           <a:xfrm>
-            <a:off x="695873" y="1530220"/>
-            <a:ext cx="5026903" cy="3816429"/>
+            <a:off x="714533" y="3225873"/>
+            <a:ext cx="4479507" cy="830997"/>
           </a:xfrm>
           <a:prstGeom prst="rect">
             <a:avLst/>
@@ -6750,36 +7513,39 @@
           <a:noFill/>
         </p:spPr>
         <p:txBody>
-          <a:bodyPr wrap="square" rtlCol="0">
+          <a:bodyPr wrap="square">
             <a:spAutoFit/>
           </a:bodyPr>
           <a:lstStyle/>
           <a:p>
-            <a:r>
-              <a:rPr lang="en-US" sz="1100" b="1" i="0" u="none" strike="noStrike" dirty="0">
+            <a:pPr rtl="0">
+              <a:spcBef>
+                <a:spcPts val="0"/>
+              </a:spcBef>
+              <a:spcAft>
+                <a:spcPts val="0"/>
+              </a:spcAft>
+            </a:pPr>
+            <a:r>
+              <a:rPr lang="en-US" sz="1200" b="1" i="1" dirty="0">
                 <a:solidFill>
                   <a:schemeClr val="tx2"/>
                 </a:solidFill>
-                <a:effectLst/>
                 <a:latin typeface="Arial" panose="020B0604020202020204" pitchFamily="34" charset="0"/>
               </a:rPr>
-              <a:t>CONTEXT</a:t>
-            </a:r>
-          </a:p>
-          <a:p>
-            <a:r>
-              <a:rPr lang="en-US" sz="1100" b="1" i="0" u="none" strike="noStrike" dirty="0">
-                <a:solidFill>
-                  <a:schemeClr val="tx2"/>
-                </a:solidFill>
-                <a:effectLst/>
-                <a:latin typeface="Arial" panose="020B0604020202020204" pitchFamily="34" charset="0"/>
-              </a:rPr>
-              <a:t>Big Mountain Resort just bought a new chair lift which increased its operational costs. The resort hopes to increase profits with a new pricing strategy. So far, the approach has been to use the average price across the entire sector as the baseline and to charge a premium without looking at specific differences. We plan to look more deeply at specific facilities that may be the most important to the customers: chairlifts available, the amount of runs, and the skiable area of the resort. By doing so, we can begin to glean a better understanding of Big Mountain Resort’s value in a more specific context instead of simply comparing to the “average” resort.</a:t>
-            </a:r>
-          </a:p>
-          <a:p>
-            <a:endParaRPr lang="en-US" sz="1100" b="1" dirty="0">
+              <a:t>What features are consumers looking for in laptops?</a:t>
+            </a:r>
+          </a:p>
+          <a:p>
+            <a:pPr rtl="0">
+              <a:spcBef>
+                <a:spcPts val="0"/>
+              </a:spcBef>
+              <a:spcAft>
+                <a:spcPts val="0"/>
+              </a:spcAft>
+            </a:pPr>
+            <a:endParaRPr lang="en-US" sz="1200" b="1" i="1" dirty="0">
               <a:solidFill>
                 <a:schemeClr val="tx2"/>
               </a:solidFill>
@@ -6787,72 +7553,80 @@
             </a:endParaRPr>
           </a:p>
           <a:p>
-            <a:r>
-              <a:rPr lang="en-US" sz="1100" b="1" dirty="0">
+            <a:pPr rtl="0">
+              <a:spcBef>
+                <a:spcPts val="0"/>
+              </a:spcBef>
+              <a:spcAft>
+                <a:spcPts val="0"/>
+              </a:spcAft>
+            </a:pPr>
+            <a:r>
+              <a:rPr lang="en-US" sz="1200" b="1" i="1" dirty="0">
                 <a:solidFill>
                   <a:schemeClr val="tx2"/>
                 </a:solidFill>
                 <a:latin typeface="Arial" panose="020B0604020202020204" pitchFamily="34" charset="0"/>
               </a:rPr>
-              <a:t>SUCCESS CRITERIA</a:t>
-            </a:r>
-          </a:p>
-          <a:p>
-            <a:r>
-              <a:rPr lang="en-US" sz="1100" b="1" i="0" u="none" strike="noStrike" dirty="0">
-                <a:solidFill>
-                  <a:schemeClr val="tx2"/>
-                </a:solidFill>
-                <a:effectLst/>
-                <a:latin typeface="Arial" panose="020B0604020202020204" pitchFamily="34" charset="0"/>
-              </a:rPr>
-              <a:t>The main criteria would be to look at a pricing strategy which can increase profits to balance out the increased $1,540,000 operating cost of the additional chair.</a:t>
-            </a:r>
-          </a:p>
-          <a:p>
-            <a:endParaRPr lang="en-US" sz="1100" b="1" dirty="0">
-              <a:solidFill>
-                <a:schemeClr val="tx2"/>
-              </a:solidFill>
-              <a:latin typeface="Arial" panose="020B0604020202020204" pitchFamily="34" charset="0"/>
-            </a:endParaRPr>
-          </a:p>
-          <a:p>
-            <a:r>
-              <a:rPr lang="en-US" sz="1100" b="1" dirty="0">
-                <a:solidFill>
-                  <a:schemeClr val="tx2"/>
-                </a:solidFill>
-                <a:latin typeface="Arial" panose="020B0604020202020204" pitchFamily="34" charset="0"/>
-              </a:rPr>
-              <a:t>SCOPE</a:t>
-            </a:r>
-          </a:p>
-          <a:p>
-            <a:r>
-              <a:rPr lang="en-US" sz="1100" b="1" i="0" u="none" strike="noStrike" dirty="0">
-                <a:solidFill>
-                  <a:schemeClr val="tx2"/>
-                </a:solidFill>
-                <a:effectLst/>
-                <a:latin typeface="Arial" panose="020B0604020202020204" pitchFamily="34" charset="0"/>
-              </a:rPr>
-              <a:t>Primarily focus on ticket price of other resorts based on their runs, chairs, and skiable area using regression analysis to best optimize the chairlift pricing. We are looking at the 330 resorts with the same market share as Big Mountain Resort to best understand the market pricing.</a:t>
-            </a:r>
-            <a:endParaRPr lang="en-US" sz="1100" dirty="0">
-              <a:solidFill>
-                <a:schemeClr val="tx2"/>
-              </a:solidFill>
-            </a:endParaRPr>
-          </a:p>
-        </p:txBody>
-      </p:sp>
-      <p:sp>
-        <p:nvSpPr>
-          <p:cNvPr id="13" name="TextBox 12">
+              <a:t>What is an appropriate price point for laptops with certain technical specifications?</a:t>
+            </a:r>
+            <a:endParaRPr lang="en-US" sz="1200" b="1" i="1" dirty="0"/>
+          </a:p>
+        </p:txBody>
+      </p:sp>
+      <p:pic>
+        <p:nvPicPr>
+          <p:cNvPr id="2050" name="Picture 2" descr="679,587 Laptop On Desk Stock Photos, Pictures &amp; Royalty-Free Images - iStock">
             <a:extLst>
               <a:ext uri="{FF2B5EF4-FFF2-40B4-BE49-F238E27FC236}">
-                <a16:creationId xmlns:a16="http://schemas.microsoft.com/office/drawing/2014/main" id="{17B89B2C-5DDD-BABD-ABDF-9E4D69418E17}"/>
+                <a16:creationId xmlns:a16="http://schemas.microsoft.com/office/drawing/2014/main" id="{58834AF8-4B1E-9C62-5D76-9D8B0E443C14}"/>
+              </a:ext>
+            </a:extLst>
+          </p:cNvPr>
+          <p:cNvPicPr>
+            <a:picLocks noChangeAspect="1" noChangeArrowheads="1"/>
+          </p:cNvPicPr>
+          <p:nvPr/>
+        </p:nvPicPr>
+        <p:blipFill>
+          <a:blip r:embed="rId2">
+            <a:extLst>
+              <a:ext uri="{28A0092B-C50C-407E-A947-70E740481C1C}">
+                <a14:useLocalDpi xmlns:a14="http://schemas.microsoft.com/office/drawing/2010/main" val="0"/>
+              </a:ext>
+            </a:extLst>
+          </a:blip>
+          <a:srcRect/>
+          <a:stretch>
+            <a:fillRect/>
+          </a:stretch>
+        </p:blipFill>
+        <p:spPr bwMode="auto">
+          <a:xfrm>
+            <a:off x="6377861" y="2151779"/>
+            <a:ext cx="3836049" cy="2148187"/>
+          </a:xfrm>
+          <a:prstGeom prst="rect">
+            <a:avLst/>
+          </a:prstGeom>
+          <a:noFill/>
+          <a:extLst>
+            <a:ext uri="{909E8E84-426E-40DD-AFC4-6F175D3DCCD1}">
+              <a14:hiddenFill xmlns:a14="http://schemas.microsoft.com/office/drawing/2010/main">
+                <a:solidFill>
+                  <a:srgbClr val="FFFFFF"/>
+                </a:solidFill>
+              </a14:hiddenFill>
+            </a:ext>
+          </a:extLst>
+        </p:spPr>
+      </p:pic>
+      <p:sp>
+        <p:nvSpPr>
+          <p:cNvPr id="8" name="TextBox 7">
+            <a:extLst>
+              <a:ext uri="{FF2B5EF4-FFF2-40B4-BE49-F238E27FC236}">
+                <a16:creationId xmlns:a16="http://schemas.microsoft.com/office/drawing/2014/main" id="{67F1628B-C46F-BFD4-DE2D-D319F0176578}"/>
               </a:ext>
             </a:extLst>
           </p:cNvPr>
@@ -6861,8 +7635,8 @@
         </p:nvSpPr>
         <p:spPr>
           <a:xfrm>
-            <a:off x="5868956" y="1530220"/>
-            <a:ext cx="5026903" cy="2292935"/>
+            <a:off x="1211405" y="4798092"/>
+            <a:ext cx="8665843" cy="338554"/>
           </a:xfrm>
           <a:prstGeom prst="rect">
             <a:avLst/>
@@ -6870,96 +7644,29 @@
           <a:noFill/>
         </p:spPr>
         <p:txBody>
-          <a:bodyPr wrap="square" rtlCol="0">
+          <a:bodyPr wrap="square">
             <a:spAutoFit/>
           </a:bodyPr>
           <a:lstStyle/>
           <a:p>
-            <a:r>
-              <a:rPr lang="en-US" sz="1100" b="1" i="0" u="none" strike="noStrike" dirty="0">
-                <a:solidFill>
-                  <a:schemeClr val="tx2"/>
-                </a:solidFill>
-                <a:effectLst/>
-                <a:latin typeface="Arial" panose="020B0604020202020204" pitchFamily="34" charset="0"/>
-              </a:rPr>
-              <a:t>CONSTRAINTS</a:t>
-            </a:r>
-          </a:p>
-          <a:p>
-            <a:endParaRPr lang="en-US" sz="1100" b="1" dirty="0">
-              <a:solidFill>
-                <a:schemeClr val="tx2"/>
-              </a:solidFill>
-              <a:latin typeface="Arial" panose="020B0604020202020204" pitchFamily="34" charset="0"/>
-            </a:endParaRPr>
-          </a:p>
-          <a:p>
-            <a:endParaRPr lang="en-US" sz="1100" b="1" dirty="0">
-              <a:solidFill>
-                <a:schemeClr val="tx2"/>
-              </a:solidFill>
-              <a:latin typeface="Arial" panose="020B0604020202020204" pitchFamily="34" charset="0"/>
-            </a:endParaRPr>
-          </a:p>
-          <a:p>
-            <a:r>
-              <a:rPr lang="en-US" sz="1100" b="1" dirty="0">
+            <a:pPr rtl="0">
+              <a:spcBef>
+                <a:spcPts val="0"/>
+              </a:spcBef>
+              <a:spcAft>
+                <a:spcPts val="0"/>
+              </a:spcAft>
+            </a:pPr>
+            <a:r>
+              <a:rPr lang="en-US" sz="1600" b="1" u="sng" dirty="0">
                 <a:solidFill>
                   <a:schemeClr val="tx2"/>
                 </a:solidFill>
                 <a:latin typeface="Arial" panose="020B0604020202020204" pitchFamily="34" charset="0"/>
               </a:rPr>
-              <a:t>STAKEHOLDERS</a:t>
-            </a:r>
-          </a:p>
-          <a:p>
-            <a:r>
-              <a:rPr lang="en-US" sz="1100" b="1" i="0" u="none" strike="noStrike" dirty="0">
-                <a:solidFill>
-                  <a:schemeClr val="tx2"/>
-                </a:solidFill>
-                <a:effectLst/>
-                <a:latin typeface="Arial" panose="020B0604020202020204" pitchFamily="34" charset="0"/>
-              </a:rPr>
-              <a:t>The main criteria would be to look at a pricing strategy which can increase profits to balance out the increased $1,540,000 operating cost of the additional chair.</a:t>
-            </a:r>
-          </a:p>
-          <a:p>
-            <a:endParaRPr lang="en-US" sz="1100" b="1" dirty="0">
-              <a:solidFill>
-                <a:schemeClr val="tx2"/>
-              </a:solidFill>
-              <a:latin typeface="Arial" panose="020B0604020202020204" pitchFamily="34" charset="0"/>
-            </a:endParaRPr>
-          </a:p>
-          <a:p>
-            <a:r>
-              <a:rPr lang="en-US" sz="1100" b="1" dirty="0">
-                <a:solidFill>
-                  <a:schemeClr val="tx2"/>
-                </a:solidFill>
-                <a:latin typeface="Arial" panose="020B0604020202020204" pitchFamily="34" charset="0"/>
-              </a:rPr>
-              <a:t>KEY DATA SOURCES</a:t>
-            </a:r>
-          </a:p>
-          <a:p>
-            <a:r>
-              <a:rPr lang="en-US" sz="1100" b="1" i="0" u="none" strike="noStrike" dirty="0">
-                <a:solidFill>
-                  <a:schemeClr val="tx2"/>
-                </a:solidFill>
-                <a:effectLst/>
-                <a:latin typeface="Arial" panose="020B0604020202020204" pitchFamily="34" charset="0"/>
-              </a:rPr>
-              <a:t>Primarily focus on ticket price of other resorts based on their runs, chairs, and skiable area using regression analysis to best optimize the chairlift pricing. We are looking at the 330 resorts with the same market share as Big Mountain Resort to best understand the market pricing.</a:t>
-            </a:r>
-            <a:endParaRPr lang="en-US" sz="1100" dirty="0">
-              <a:solidFill>
-                <a:schemeClr val="tx2"/>
-              </a:solidFill>
-            </a:endParaRPr>
+              <a:t>We will use a dataset of scraped laptop pricing data to answer these questions</a:t>
+            </a:r>
+            <a:endParaRPr lang="en-US" sz="1600" b="1" u="sng" dirty="0"/>
           </a:p>
         </p:txBody>
       </p:sp>
@@ -6998,7 +7705,7 @@
           <p:cNvPr id="2" name="Title 1">
             <a:extLst>
               <a:ext uri="{FF2B5EF4-FFF2-40B4-BE49-F238E27FC236}">
-                <a16:creationId xmlns:a16="http://schemas.microsoft.com/office/drawing/2014/main" id="{461DF5DC-B11E-98B3-AC7E-245F4B34C444}"/>
+                <a16:creationId xmlns:a16="http://schemas.microsoft.com/office/drawing/2014/main" id="{5A03B3C5-0795-4451-6D27-E123EB0B42AE}"/>
               </a:ext>
             </a:extLst>
           </p:cNvPr>
@@ -7009,47 +7716,181 @@
             <p:ph type="title"/>
           </p:nvPr>
         </p:nvSpPr>
-        <p:spPr/>
+        <p:spPr>
+          <a:xfrm>
+            <a:off x="677212" y="220318"/>
+            <a:ext cx="8222397" cy="467544"/>
+          </a:xfrm>
+        </p:spPr>
         <p:txBody>
           <a:bodyPr/>
           <a:lstStyle/>
           <a:p>
             <a:r>
-              <a:rPr lang="en-US" dirty="0"/>
-              <a:t>Data Cleaning</a:t>
-            </a:r>
-          </a:p>
-        </p:txBody>
-      </p:sp>
-      <p:sp>
-        <p:nvSpPr>
-          <p:cNvPr id="3" name="Content Placeholder 2">
+              <a:rPr lang="en-US" sz="2400" u="sng" dirty="0"/>
+              <a:t>Interested Parties</a:t>
+            </a:r>
+          </a:p>
+        </p:txBody>
+      </p:sp>
+      <p:sp>
+        <p:nvSpPr>
+          <p:cNvPr id="6" name="Title 1">
             <a:extLst>
               <a:ext uri="{FF2B5EF4-FFF2-40B4-BE49-F238E27FC236}">
-                <a16:creationId xmlns:a16="http://schemas.microsoft.com/office/drawing/2014/main" id="{CF44651B-16AF-6CB5-7D0B-67FD820BCFA1}"/>
+                <a16:creationId xmlns:a16="http://schemas.microsoft.com/office/drawing/2014/main" id="{F560AC2F-D5D6-9FCE-C00D-9DBEB869AB98}"/>
               </a:ext>
             </a:extLst>
           </p:cNvPr>
-          <p:cNvSpPr>
-            <a:spLocks noGrp="1"/>
-          </p:cNvSpPr>
-          <p:nvPr>
-            <p:ph idx="1"/>
-          </p:nvPr>
-        </p:nvSpPr>
-        <p:spPr/>
-        <p:txBody>
-          <a:bodyPr/>
-          <a:lstStyle/>
-          <a:p>
-            <a:endParaRPr lang="en-US"/>
-          </a:p>
-        </p:txBody>
-      </p:sp>
+          <p:cNvSpPr txBox="1">
+            <a:spLocks/>
+          </p:cNvSpPr>
+          <p:nvPr/>
+        </p:nvSpPr>
+        <p:spPr>
+          <a:xfrm>
+            <a:off x="3684826" y="1705316"/>
+            <a:ext cx="4822346" cy="467544"/>
+          </a:xfrm>
+          <a:prstGeom prst="rect">
+            <a:avLst/>
+          </a:prstGeom>
+        </p:spPr>
+        <p:txBody>
+          <a:bodyPr vert="horz" lIns="91440" tIns="45720" rIns="91440" bIns="45720" rtlCol="0" anchor="t">
+            <a:noAutofit/>
+          </a:bodyPr>
+          <a:lstStyle>
+            <a:lvl1pPr algn="l" defTabSz="457200" rtl="0" eaLnBrk="1" latinLnBrk="0" hangingPunct="1">
+              <a:spcBef>
+                <a:spcPct val="0"/>
+              </a:spcBef>
+              <a:buNone/>
+              <a:defRPr sz="4200" b="0" i="0" kern="1200">
+                <a:solidFill>
+                  <a:schemeClr val="tx2"/>
+                </a:solidFill>
+                <a:latin typeface="+mj-lt"/>
+                <a:ea typeface="+mj-ea"/>
+                <a:cs typeface="+mj-cs"/>
+              </a:defRPr>
+            </a:lvl1pPr>
+            <a:lvl2pPr eaLnBrk="1" hangingPunct="1">
+              <a:defRPr>
+                <a:solidFill>
+                  <a:schemeClr val="tx2"/>
+                </a:solidFill>
+              </a:defRPr>
+            </a:lvl2pPr>
+            <a:lvl3pPr eaLnBrk="1" hangingPunct="1">
+              <a:defRPr>
+                <a:solidFill>
+                  <a:schemeClr val="tx2"/>
+                </a:solidFill>
+              </a:defRPr>
+            </a:lvl3pPr>
+            <a:lvl4pPr eaLnBrk="1" hangingPunct="1">
+              <a:defRPr>
+                <a:solidFill>
+                  <a:schemeClr val="tx2"/>
+                </a:solidFill>
+              </a:defRPr>
+            </a:lvl4pPr>
+            <a:lvl5pPr eaLnBrk="1" hangingPunct="1">
+              <a:defRPr>
+                <a:solidFill>
+                  <a:schemeClr val="tx2"/>
+                </a:solidFill>
+              </a:defRPr>
+            </a:lvl5pPr>
+            <a:lvl6pPr eaLnBrk="1" hangingPunct="1">
+              <a:defRPr>
+                <a:solidFill>
+                  <a:schemeClr val="tx2"/>
+                </a:solidFill>
+              </a:defRPr>
+            </a:lvl6pPr>
+            <a:lvl7pPr eaLnBrk="1" hangingPunct="1">
+              <a:defRPr>
+                <a:solidFill>
+                  <a:schemeClr val="tx2"/>
+                </a:solidFill>
+              </a:defRPr>
+            </a:lvl7pPr>
+            <a:lvl8pPr eaLnBrk="1" hangingPunct="1">
+              <a:defRPr>
+                <a:solidFill>
+                  <a:schemeClr val="tx2"/>
+                </a:solidFill>
+              </a:defRPr>
+            </a:lvl8pPr>
+            <a:lvl9pPr eaLnBrk="1" hangingPunct="1">
+              <a:defRPr>
+                <a:solidFill>
+                  <a:schemeClr val="tx2"/>
+                </a:solidFill>
+              </a:defRPr>
+            </a:lvl9pPr>
+          </a:lstStyle>
+          <a:p>
+            <a:r>
+              <a:rPr lang="en-US" sz="2400" dirty="0"/>
+              <a:t>Any company that sells laptops</a:t>
+            </a:r>
+          </a:p>
+        </p:txBody>
+      </p:sp>
+      <p:pic>
+        <p:nvPicPr>
+          <p:cNvPr id="3078" name="Picture 6">
+            <a:extLst>
+              <a:ext uri="{FF2B5EF4-FFF2-40B4-BE49-F238E27FC236}">
+                <a16:creationId xmlns:a16="http://schemas.microsoft.com/office/drawing/2014/main" id="{01E4DDB2-9404-44F1-DEAA-207FF4786693}"/>
+              </a:ext>
+            </a:extLst>
+          </p:cNvPr>
+          <p:cNvPicPr>
+            <a:picLocks noChangeAspect="1" noChangeArrowheads="1"/>
+          </p:cNvPicPr>
+          <p:nvPr/>
+        </p:nvPicPr>
+        <p:blipFill>
+          <a:blip r:embed="rId2">
+            <a:extLst>
+              <a:ext uri="{28A0092B-C50C-407E-A947-70E740481C1C}">
+                <a14:useLocalDpi xmlns:a14="http://schemas.microsoft.com/office/drawing/2010/main" val="0"/>
+              </a:ext>
+            </a:extLst>
+          </a:blip>
+          <a:srcRect/>
+          <a:stretch>
+            <a:fillRect/>
+          </a:stretch>
+        </p:blipFill>
+        <p:spPr bwMode="auto">
+          <a:xfrm>
+            <a:off x="2596304" y="2277314"/>
+            <a:ext cx="6999391" cy="2303371"/>
+          </a:xfrm>
+          <a:prstGeom prst="rect">
+            <a:avLst/>
+          </a:prstGeom>
+          <a:noFill/>
+          <a:extLst>
+            <a:ext uri="{909E8E84-426E-40DD-AFC4-6F175D3DCCD1}">
+              <a14:hiddenFill xmlns:a14="http://schemas.microsoft.com/office/drawing/2010/main">
+                <a:solidFill>
+                  <a:srgbClr val="FFFFFF"/>
+                </a:solidFill>
+              </a14:hiddenFill>
+            </a:ext>
+          </a:extLst>
+        </p:spPr>
+      </p:pic>
     </p:spTree>
     <p:extLst>
       <p:ext uri="{BB962C8B-B14F-4D97-AF65-F5344CB8AC3E}">
-        <p14:creationId xmlns:p14="http://schemas.microsoft.com/office/powerpoint/2010/main" val="1153321932"/>
+        <p14:creationId xmlns:p14="http://schemas.microsoft.com/office/powerpoint/2010/main" val="319204702"/>
       </p:ext>
     </p:extLst>
   </p:cSld>
@@ -7081,7 +7922,7 @@
           <p:cNvPr id="2" name="Title 1">
             <a:extLst>
               <a:ext uri="{FF2B5EF4-FFF2-40B4-BE49-F238E27FC236}">
-                <a16:creationId xmlns:a16="http://schemas.microsoft.com/office/drawing/2014/main" id="{D86DE1B0-5B88-5CDE-5369-8F4650A49A28}"/>
+                <a16:creationId xmlns:a16="http://schemas.microsoft.com/office/drawing/2014/main" id="{461DF5DC-B11E-98B3-AC7E-245F4B34C444}"/>
               </a:ext>
             </a:extLst>
           </p:cNvPr>
@@ -7099,7 +7940,7 @@
           <a:p>
             <a:r>
               <a:rPr lang="en-US" dirty="0"/>
-              <a:t>EDA</a:t>
+              <a:t>Data Wrangling</a:t>
             </a:r>
           </a:p>
         </p:txBody>
@@ -7109,7 +7950,7 @@
           <p:cNvPr id="3" name="Content Placeholder 2">
             <a:extLst>
               <a:ext uri="{FF2B5EF4-FFF2-40B4-BE49-F238E27FC236}">
-                <a16:creationId xmlns:a16="http://schemas.microsoft.com/office/drawing/2014/main" id="{584909B6-33B3-D639-50BB-FB628C77A894}"/>
+                <a16:creationId xmlns:a16="http://schemas.microsoft.com/office/drawing/2014/main" id="{CF44651B-16AF-6CB5-7D0B-67FD820BCFA1}"/>
               </a:ext>
             </a:extLst>
           </p:cNvPr>
@@ -7120,19 +7961,149 @@
             <p:ph idx="1"/>
           </p:nvPr>
         </p:nvSpPr>
-        <p:spPr/>
+        <p:spPr>
+          <a:xfrm>
+            <a:off x="646111" y="1152983"/>
+            <a:ext cx="8946541" cy="4195481"/>
+          </a:xfrm>
+        </p:spPr>
         <p:txBody>
           <a:bodyPr/>
           <a:lstStyle/>
           <a:p>
-            <a:endParaRPr lang="en-US"/>
+            <a:r>
+              <a:rPr lang="en-US" dirty="0"/>
+              <a:t>GOALS: Remove unnecessary features and tidy up some data</a:t>
+            </a:r>
+          </a:p>
+          <a:p>
+            <a:r>
+              <a:rPr lang="en-US" dirty="0"/>
+              <a:t>Following columns unnecessary and dropped:</a:t>
+            </a:r>
+          </a:p>
+          <a:p>
+            <a:pPr lvl="1"/>
+            <a:r>
+              <a:rPr lang="en-US" dirty="0" err="1"/>
+              <a:t>old_price</a:t>
+            </a:r>
+            <a:endParaRPr lang="en-US" dirty="0"/>
+          </a:p>
+          <a:p>
+            <a:pPr lvl="1"/>
+            <a:r>
+              <a:rPr lang="en-US" dirty="0"/>
+              <a:t>discount</a:t>
+            </a:r>
+          </a:p>
+          <a:p>
+            <a:pPr lvl="1"/>
+            <a:r>
+              <a:rPr lang="en-US" dirty="0"/>
+              <a:t>reviews</a:t>
+            </a:r>
+          </a:p>
+          <a:p>
+            <a:pPr lvl="1"/>
+            <a:r>
+              <a:rPr lang="en-US" dirty="0" err="1"/>
+              <a:t>star_rating</a:t>
+            </a:r>
+            <a:endParaRPr lang="en-US" dirty="0"/>
+          </a:p>
+          <a:p>
+            <a:pPr lvl="1"/>
+            <a:r>
+              <a:rPr lang="en-US" dirty="0"/>
+              <a:t>ratings</a:t>
+            </a:r>
+          </a:p>
+        </p:txBody>
+      </p:sp>
+      <p:pic>
+        <p:nvPicPr>
+          <p:cNvPr id="5" name="Picture 4">
+            <a:extLst>
+              <a:ext uri="{FF2B5EF4-FFF2-40B4-BE49-F238E27FC236}">
+                <a16:creationId xmlns:a16="http://schemas.microsoft.com/office/drawing/2014/main" id="{3FD04AC2-812D-D385-5C93-78455FF8821F}"/>
+              </a:ext>
+            </a:extLst>
+          </p:cNvPr>
+          <p:cNvPicPr>
+            <a:picLocks noChangeAspect="1"/>
+          </p:cNvPicPr>
+          <p:nvPr/>
+        </p:nvPicPr>
+        <p:blipFill>
+          <a:blip r:embed="rId2"/>
+          <a:stretch>
+            <a:fillRect/>
+          </a:stretch>
+        </p:blipFill>
+        <p:spPr>
+          <a:xfrm>
+            <a:off x="4821979" y="2090509"/>
+            <a:ext cx="7091534" cy="4498528"/>
+          </a:xfrm>
+          <a:prstGeom prst="rect">
+            <a:avLst/>
+          </a:prstGeom>
+        </p:spPr>
+      </p:pic>
+      <p:sp>
+        <p:nvSpPr>
+          <p:cNvPr id="6" name="Arrow: Right 5">
+            <a:extLst>
+              <a:ext uri="{FF2B5EF4-FFF2-40B4-BE49-F238E27FC236}">
+                <a16:creationId xmlns:a16="http://schemas.microsoft.com/office/drawing/2014/main" id="{7B85BFB7-5B97-CF64-F0A8-30EC390C7539}"/>
+              </a:ext>
+            </a:extLst>
+          </p:cNvPr>
+          <p:cNvSpPr/>
+          <p:nvPr/>
+        </p:nvSpPr>
+        <p:spPr>
+          <a:xfrm>
+            <a:off x="776253" y="4499637"/>
+            <a:ext cx="3815482" cy="1549092"/>
+          </a:xfrm>
+          <a:prstGeom prst="rightArrow">
+            <a:avLst/>
+          </a:prstGeom>
+        </p:spPr>
+        <p:style>
+          <a:lnRef idx="2">
+            <a:schemeClr val="accent1">
+              <a:shade val="50000"/>
+            </a:schemeClr>
+          </a:lnRef>
+          <a:fillRef idx="1">
+            <a:schemeClr val="accent1"/>
+          </a:fillRef>
+          <a:effectRef idx="0">
+            <a:schemeClr val="accent1"/>
+          </a:effectRef>
+          <a:fontRef idx="minor">
+            <a:schemeClr val="lt1"/>
+          </a:fontRef>
+        </p:style>
+        <p:txBody>
+          <a:bodyPr rtlCol="0" anchor="ctr"/>
+          <a:lstStyle/>
+          <a:p>
+            <a:pPr algn="ctr"/>
+            <a:r>
+              <a:rPr lang="en-US" dirty="0"/>
+              <a:t>Understanding data distributions</a:t>
+            </a:r>
           </a:p>
         </p:txBody>
       </p:sp>
     </p:spTree>
     <p:extLst>
       <p:ext uri="{BB962C8B-B14F-4D97-AF65-F5344CB8AC3E}">
-        <p14:creationId xmlns:p14="http://schemas.microsoft.com/office/powerpoint/2010/main" val="2436102395"/>
+        <p14:creationId xmlns:p14="http://schemas.microsoft.com/office/powerpoint/2010/main" val="1153321932"/>
       </p:ext>
     </p:extLst>
   </p:cSld>
@@ -7182,7 +8153,7 @@
           <a:p>
             <a:r>
               <a:rPr lang="en-US" dirty="0"/>
-              <a:t>EDA</a:t>
+              <a:t>Exploratory Data Analysis</a:t>
             </a:r>
           </a:p>
         </p:txBody>
@@ -7203,19 +8174,338 @@
             <p:ph idx="1"/>
           </p:nvPr>
         </p:nvSpPr>
-        <p:spPr/>
+        <p:spPr>
+          <a:xfrm>
+            <a:off x="723867" y="1152983"/>
+            <a:ext cx="8946541" cy="4195481"/>
+          </a:xfrm>
+        </p:spPr>
         <p:txBody>
           <a:bodyPr/>
           <a:lstStyle/>
           <a:p>
+            <a:r>
+              <a:rPr lang="en-US" dirty="0"/>
+              <a:t>GOALS: Understand our data and building our model hypothesis</a:t>
+            </a:r>
+          </a:p>
+          <a:p>
+            <a:r>
+              <a:rPr lang="en-US" dirty="0"/>
+              <a:t>Primary Exploration - Median and Correlation</a:t>
+            </a:r>
+          </a:p>
+        </p:txBody>
+      </p:sp>
+      <p:pic>
+        <p:nvPicPr>
+          <p:cNvPr id="5" name="Picture 4" descr="Chart&#10;&#10;Description automatically generated with medium confidence">
+            <a:extLst>
+              <a:ext uri="{FF2B5EF4-FFF2-40B4-BE49-F238E27FC236}">
+                <a16:creationId xmlns:a16="http://schemas.microsoft.com/office/drawing/2014/main" id="{51C2F15F-115B-40BF-C92B-814BA53F894C}"/>
+              </a:ext>
+            </a:extLst>
+          </p:cNvPr>
+          <p:cNvPicPr>
+            <a:picLocks noChangeAspect="1"/>
+          </p:cNvPicPr>
+          <p:nvPr/>
+        </p:nvPicPr>
+        <p:blipFill>
+          <a:blip r:embed="rId2">
+            <a:extLst>
+              <a:ext uri="{28A0092B-C50C-407E-A947-70E740481C1C}">
+                <a14:useLocalDpi xmlns:a14="http://schemas.microsoft.com/office/drawing/2010/main" val="0"/>
+              </a:ext>
+            </a:extLst>
+          </a:blip>
+          <a:stretch>
+            <a:fillRect/>
+          </a:stretch>
+        </p:blipFill>
+        <p:spPr>
+          <a:xfrm>
+            <a:off x="723867" y="2091235"/>
+            <a:ext cx="4350138" cy="4097359"/>
+          </a:xfrm>
+          <a:prstGeom prst="rect">
+            <a:avLst/>
+          </a:prstGeom>
+        </p:spPr>
+      </p:pic>
+      <p:pic>
+        <p:nvPicPr>
+          <p:cNvPr id="7" name="Picture 6" descr="A picture containing chart&#10;&#10;Description automatically generated">
+            <a:extLst>
+              <a:ext uri="{FF2B5EF4-FFF2-40B4-BE49-F238E27FC236}">
+                <a16:creationId xmlns:a16="http://schemas.microsoft.com/office/drawing/2014/main" id="{EDECB208-7012-620A-FEC9-52B2861FC729}"/>
+              </a:ext>
+            </a:extLst>
+          </p:cNvPr>
+          <p:cNvPicPr>
+            <a:picLocks noChangeAspect="1"/>
+          </p:cNvPicPr>
+          <p:nvPr/>
+        </p:nvPicPr>
+        <p:blipFill>
+          <a:blip r:embed="rId3">
+            <a:extLst>
+              <a:ext uri="{28A0092B-C50C-407E-A947-70E740481C1C}">
+                <a14:useLocalDpi xmlns:a14="http://schemas.microsoft.com/office/drawing/2010/main" val="0"/>
+              </a:ext>
+            </a:extLst>
+          </a:blip>
+          <a:stretch>
+            <a:fillRect/>
+          </a:stretch>
+        </p:blipFill>
+        <p:spPr>
+          <a:xfrm>
+            <a:off x="5621701" y="2091235"/>
+            <a:ext cx="5145825" cy="3723694"/>
+          </a:xfrm>
+          <a:prstGeom prst="rect">
+            <a:avLst/>
+          </a:prstGeom>
+        </p:spPr>
+      </p:pic>
+      <p:sp>
+        <p:nvSpPr>
+          <p:cNvPr id="8" name="Arrow: Up 7">
+            <a:extLst>
+              <a:ext uri="{FF2B5EF4-FFF2-40B4-BE49-F238E27FC236}">
+                <a16:creationId xmlns:a16="http://schemas.microsoft.com/office/drawing/2014/main" id="{4C8C64CA-E74B-8DB0-DB7D-2EE996343BCB}"/>
+              </a:ext>
+            </a:extLst>
+          </p:cNvPr>
+          <p:cNvSpPr/>
+          <p:nvPr/>
+        </p:nvSpPr>
+        <p:spPr>
+          <a:xfrm>
+            <a:off x="5927913" y="5832442"/>
+            <a:ext cx="263137" cy="394706"/>
+          </a:xfrm>
+          <a:prstGeom prst="upArrow">
+            <a:avLst/>
+          </a:prstGeom>
+        </p:spPr>
+        <p:style>
+          <a:lnRef idx="2">
+            <a:schemeClr val="accent1">
+              <a:shade val="50000"/>
+            </a:schemeClr>
+          </a:lnRef>
+          <a:fillRef idx="1">
+            <a:schemeClr val="accent1"/>
+          </a:fillRef>
+          <a:effectRef idx="0">
+            <a:schemeClr val="accent1"/>
+          </a:effectRef>
+          <a:fontRef idx="minor">
+            <a:schemeClr val="lt1"/>
+          </a:fontRef>
+        </p:style>
+        <p:txBody>
+          <a:bodyPr rtlCol="0" anchor="ctr"/>
+          <a:lstStyle/>
+          <a:p>
+            <a:pPr algn="ctr"/>
             <a:endParaRPr lang="en-US"/>
+          </a:p>
+        </p:txBody>
+      </p:sp>
+      <p:sp>
+        <p:nvSpPr>
+          <p:cNvPr id="10" name="Arrow: Up 9">
+            <a:extLst>
+              <a:ext uri="{FF2B5EF4-FFF2-40B4-BE49-F238E27FC236}">
+                <a16:creationId xmlns:a16="http://schemas.microsoft.com/office/drawing/2014/main" id="{4E655FAA-80CB-DF10-0622-0401174011BE}"/>
+              </a:ext>
+            </a:extLst>
+          </p:cNvPr>
+          <p:cNvSpPr/>
+          <p:nvPr/>
+        </p:nvSpPr>
+        <p:spPr>
+          <a:xfrm>
+            <a:off x="6553245" y="5832442"/>
+            <a:ext cx="263137" cy="394706"/>
+          </a:xfrm>
+          <a:prstGeom prst="upArrow">
+            <a:avLst/>
+          </a:prstGeom>
+        </p:spPr>
+        <p:style>
+          <a:lnRef idx="2">
+            <a:schemeClr val="accent1">
+              <a:shade val="50000"/>
+            </a:schemeClr>
+          </a:lnRef>
+          <a:fillRef idx="1">
+            <a:schemeClr val="accent1"/>
+          </a:fillRef>
+          <a:effectRef idx="0">
+            <a:schemeClr val="accent1"/>
+          </a:effectRef>
+          <a:fontRef idx="minor">
+            <a:schemeClr val="lt1"/>
+          </a:fontRef>
+        </p:style>
+        <p:txBody>
+          <a:bodyPr rtlCol="0" anchor="ctr"/>
+          <a:lstStyle/>
+          <a:p>
+            <a:pPr algn="ctr"/>
+            <a:endParaRPr lang="en-US"/>
+          </a:p>
+        </p:txBody>
+      </p:sp>
+      <p:sp>
+        <p:nvSpPr>
+          <p:cNvPr id="11" name="Arrow: Up 10">
+            <a:extLst>
+              <a:ext uri="{FF2B5EF4-FFF2-40B4-BE49-F238E27FC236}">
+                <a16:creationId xmlns:a16="http://schemas.microsoft.com/office/drawing/2014/main" id="{E9AA5C9A-BAE6-360A-F45F-0D566B25BB30}"/>
+              </a:ext>
+            </a:extLst>
+          </p:cNvPr>
+          <p:cNvSpPr/>
+          <p:nvPr/>
+        </p:nvSpPr>
+        <p:spPr>
+          <a:xfrm>
+            <a:off x="7178577" y="5832442"/>
+            <a:ext cx="263137" cy="394706"/>
+          </a:xfrm>
+          <a:prstGeom prst="upArrow">
+            <a:avLst/>
+          </a:prstGeom>
+        </p:spPr>
+        <p:style>
+          <a:lnRef idx="2">
+            <a:schemeClr val="accent1">
+              <a:shade val="50000"/>
+            </a:schemeClr>
+          </a:lnRef>
+          <a:fillRef idx="1">
+            <a:schemeClr val="accent1"/>
+          </a:fillRef>
+          <a:effectRef idx="0">
+            <a:schemeClr val="accent1"/>
+          </a:effectRef>
+          <a:fontRef idx="minor">
+            <a:schemeClr val="lt1"/>
+          </a:fontRef>
+        </p:style>
+        <p:txBody>
+          <a:bodyPr rtlCol="0" anchor="ctr"/>
+          <a:lstStyle/>
+          <a:p>
+            <a:pPr algn="ctr"/>
+            <a:endParaRPr lang="en-US"/>
+          </a:p>
+        </p:txBody>
+      </p:sp>
+      <p:sp>
+        <p:nvSpPr>
+          <p:cNvPr id="12" name="Arrow: Up 11">
+            <a:extLst>
+              <a:ext uri="{FF2B5EF4-FFF2-40B4-BE49-F238E27FC236}">
+                <a16:creationId xmlns:a16="http://schemas.microsoft.com/office/drawing/2014/main" id="{356BCF38-1DAF-B75E-3027-2900FA3144FB}"/>
+              </a:ext>
+            </a:extLst>
+          </p:cNvPr>
+          <p:cNvSpPr/>
+          <p:nvPr/>
+        </p:nvSpPr>
+        <p:spPr>
+          <a:xfrm>
+            <a:off x="8461478" y="5851376"/>
+            <a:ext cx="263137" cy="394706"/>
+          </a:xfrm>
+          <a:prstGeom prst="upArrow">
+            <a:avLst/>
+          </a:prstGeom>
+        </p:spPr>
+        <p:style>
+          <a:lnRef idx="2">
+            <a:schemeClr val="accent1">
+              <a:shade val="50000"/>
+            </a:schemeClr>
+          </a:lnRef>
+          <a:fillRef idx="1">
+            <a:schemeClr val="accent1"/>
+          </a:fillRef>
+          <a:effectRef idx="0">
+            <a:schemeClr val="accent1"/>
+          </a:effectRef>
+          <a:fontRef idx="minor">
+            <a:schemeClr val="lt1"/>
+          </a:fontRef>
+        </p:style>
+        <p:txBody>
+          <a:bodyPr rtlCol="0" anchor="ctr"/>
+          <a:lstStyle/>
+          <a:p>
+            <a:pPr algn="ctr"/>
+            <a:endParaRPr lang="en-US"/>
+          </a:p>
+        </p:txBody>
+      </p:sp>
+      <p:sp>
+        <p:nvSpPr>
+          <p:cNvPr id="13" name="Rectangle 12">
+            <a:extLst>
+              <a:ext uri="{FF2B5EF4-FFF2-40B4-BE49-F238E27FC236}">
+                <a16:creationId xmlns:a16="http://schemas.microsoft.com/office/drawing/2014/main" id="{7BA7E443-5DAD-5AF1-47E1-CAEB446188D2}"/>
+              </a:ext>
+            </a:extLst>
+          </p:cNvPr>
+          <p:cNvSpPr/>
+          <p:nvPr/>
+        </p:nvSpPr>
+        <p:spPr>
+          <a:xfrm>
+            <a:off x="5627525" y="6282529"/>
+            <a:ext cx="3365240" cy="329681"/>
+          </a:xfrm>
+          <a:prstGeom prst="rect">
+            <a:avLst/>
+          </a:prstGeom>
+        </p:spPr>
+        <p:style>
+          <a:lnRef idx="2">
+            <a:schemeClr val="accent1">
+              <a:shade val="50000"/>
+            </a:schemeClr>
+          </a:lnRef>
+          <a:fillRef idx="1">
+            <a:schemeClr val="accent1"/>
+          </a:fillRef>
+          <a:effectRef idx="0">
+            <a:schemeClr val="accent1"/>
+          </a:effectRef>
+          <a:fontRef idx="minor">
+            <a:schemeClr val="lt1"/>
+          </a:fontRef>
+        </p:style>
+        <p:txBody>
+          <a:bodyPr rtlCol="0" anchor="ctr"/>
+          <a:lstStyle/>
+          <a:p>
+            <a:pPr algn="ctr"/>
+            <a:r>
+              <a:rPr lang="en-US" dirty="0"/>
+              <a:t>Features with correlations</a:t>
+            </a:r>
           </a:p>
         </p:txBody>
       </p:sp>
     </p:spTree>
     <p:extLst>
       <p:ext uri="{BB962C8B-B14F-4D97-AF65-F5344CB8AC3E}">
-        <p14:creationId xmlns:p14="http://schemas.microsoft.com/office/powerpoint/2010/main" val="3040043632"/>
+        <p14:creationId xmlns:p14="http://schemas.microsoft.com/office/powerpoint/2010/main" val="2436102395"/>
       </p:ext>
     </p:extLst>
   </p:cSld>
@@ -7265,32 +8555,278 @@
           <a:p>
             <a:r>
               <a:rPr lang="en-US" dirty="0"/>
-              <a:t>Data Pre-Processing</a:t>
-            </a:r>
-          </a:p>
-        </p:txBody>
-      </p:sp>
-      <p:sp>
-        <p:nvSpPr>
-          <p:cNvPr id="3" name="Content Placeholder 2">
+              <a:t>Exploratory Data Analysis</a:t>
+            </a:r>
+          </a:p>
+        </p:txBody>
+      </p:sp>
+      <p:pic>
+        <p:nvPicPr>
+          <p:cNvPr id="5" name="Content Placeholder 4">
             <a:extLst>
               <a:ext uri="{FF2B5EF4-FFF2-40B4-BE49-F238E27FC236}">
-                <a16:creationId xmlns:a16="http://schemas.microsoft.com/office/drawing/2014/main" id="{584909B6-33B3-D639-50BB-FB628C77A894}"/>
+                <a16:creationId xmlns:a16="http://schemas.microsoft.com/office/drawing/2014/main" id="{B9155EB2-329D-DF79-920A-95DB4CD2542C}"/>
               </a:ext>
             </a:extLst>
           </p:cNvPr>
-          <p:cNvSpPr>
-            <a:spLocks noGrp="1"/>
-          </p:cNvSpPr>
+          <p:cNvPicPr>
+            <a:picLocks noGrp="1" noChangeAspect="1"/>
+          </p:cNvPicPr>
           <p:nvPr>
             <p:ph idx="1"/>
           </p:nvPr>
-        </p:nvSpPr>
-        <p:spPr/>
-        <p:txBody>
-          <a:bodyPr/>
+        </p:nvPicPr>
+        <p:blipFill>
+          <a:blip r:embed="rId2"/>
+          <a:stretch>
+            <a:fillRect/>
+          </a:stretch>
+        </p:blipFill>
+        <p:spPr>
+          <a:xfrm>
+            <a:off x="745576" y="1853248"/>
+            <a:ext cx="4134470" cy="4195763"/>
+          </a:xfrm>
+        </p:spPr>
+      </p:pic>
+      <p:sp>
+        <p:nvSpPr>
+          <p:cNvPr id="6" name="TextBox 5">
+            <a:extLst>
+              <a:ext uri="{FF2B5EF4-FFF2-40B4-BE49-F238E27FC236}">
+                <a16:creationId xmlns:a16="http://schemas.microsoft.com/office/drawing/2014/main" id="{62A7DF69-6B1C-0202-FE3D-3296390240E4}"/>
+              </a:ext>
+            </a:extLst>
+          </p:cNvPr>
+          <p:cNvSpPr txBox="1"/>
+          <p:nvPr/>
+        </p:nvSpPr>
+        <p:spPr>
+          <a:xfrm>
+            <a:off x="809145" y="1269635"/>
+            <a:ext cx="8913756" cy="369332"/>
+          </a:xfrm>
+          <a:prstGeom prst="rect">
+            <a:avLst/>
+          </a:prstGeom>
+          <a:noFill/>
+        </p:spPr>
+        <p:txBody>
+          <a:bodyPr wrap="square" rtlCol="0">
+            <a:spAutoFit/>
+          </a:bodyPr>
           <a:lstStyle/>
           <a:p>
+            <a:r>
+              <a:rPr lang="en-US" dirty="0"/>
+              <a:t>Box Plots show similarities and differences</a:t>
+            </a:r>
+          </a:p>
+        </p:txBody>
+      </p:sp>
+      <p:pic>
+        <p:nvPicPr>
+          <p:cNvPr id="8" name="Picture 7">
+            <a:extLst>
+              <a:ext uri="{FF2B5EF4-FFF2-40B4-BE49-F238E27FC236}">
+                <a16:creationId xmlns:a16="http://schemas.microsoft.com/office/drawing/2014/main" id="{3080BA47-32AF-5757-A963-9D8A6A0B5522}"/>
+              </a:ext>
+            </a:extLst>
+          </p:cNvPr>
+          <p:cNvPicPr>
+            <a:picLocks noChangeAspect="1"/>
+          </p:cNvPicPr>
+          <p:nvPr/>
+        </p:nvPicPr>
+        <p:blipFill>
+          <a:blip r:embed="rId3"/>
+          <a:stretch>
+            <a:fillRect/>
+          </a:stretch>
+        </p:blipFill>
+        <p:spPr>
+          <a:xfrm>
+            <a:off x="5633189" y="1388381"/>
+            <a:ext cx="5131400" cy="2456359"/>
+          </a:xfrm>
+          <a:prstGeom prst="rect">
+            <a:avLst/>
+          </a:prstGeom>
+        </p:spPr>
+      </p:pic>
+      <p:pic>
+        <p:nvPicPr>
+          <p:cNvPr id="10" name="Picture 9">
+            <a:extLst>
+              <a:ext uri="{FF2B5EF4-FFF2-40B4-BE49-F238E27FC236}">
+                <a16:creationId xmlns:a16="http://schemas.microsoft.com/office/drawing/2014/main" id="{F386C598-DC83-6667-304A-AFFE2D29297A}"/>
+              </a:ext>
+            </a:extLst>
+          </p:cNvPr>
+          <p:cNvPicPr>
+            <a:picLocks noChangeAspect="1"/>
+          </p:cNvPicPr>
+          <p:nvPr/>
+        </p:nvPicPr>
+        <p:blipFill>
+          <a:blip r:embed="rId4"/>
+          <a:stretch>
+            <a:fillRect/>
+          </a:stretch>
+        </p:blipFill>
+        <p:spPr>
+          <a:xfrm>
+            <a:off x="5633189" y="3974510"/>
+            <a:ext cx="5131400" cy="2350612"/>
+          </a:xfrm>
+          <a:prstGeom prst="rect">
+            <a:avLst/>
+          </a:prstGeom>
+        </p:spPr>
+      </p:pic>
+      <p:sp>
+        <p:nvSpPr>
+          <p:cNvPr id="11" name="Arrow: Left 10">
+            <a:extLst>
+              <a:ext uri="{FF2B5EF4-FFF2-40B4-BE49-F238E27FC236}">
+                <a16:creationId xmlns:a16="http://schemas.microsoft.com/office/drawing/2014/main" id="{9761BB03-9B75-0D8E-E691-DCB404FC10FF}"/>
+              </a:ext>
+            </a:extLst>
+          </p:cNvPr>
+          <p:cNvSpPr/>
+          <p:nvPr/>
+        </p:nvSpPr>
+        <p:spPr>
+          <a:xfrm rot="20050465">
+            <a:off x="10018473" y="2131559"/>
+            <a:ext cx="705372" cy="348776"/>
+          </a:xfrm>
+          <a:prstGeom prst="leftArrow">
+            <a:avLst>
+              <a:gd name="adj1" fmla="val 40480"/>
+              <a:gd name="adj2" fmla="val 50000"/>
+            </a:avLst>
+          </a:prstGeom>
+        </p:spPr>
+        <p:style>
+          <a:lnRef idx="2">
+            <a:schemeClr val="accent1">
+              <a:shade val="50000"/>
+            </a:schemeClr>
+          </a:lnRef>
+          <a:fillRef idx="1">
+            <a:schemeClr val="accent1"/>
+          </a:fillRef>
+          <a:effectRef idx="0">
+            <a:schemeClr val="accent1"/>
+          </a:effectRef>
+          <a:fontRef idx="minor">
+            <a:schemeClr val="lt1"/>
+          </a:fontRef>
+        </p:style>
+        <p:txBody>
+          <a:bodyPr rtlCol="0" anchor="ctr"/>
+          <a:lstStyle/>
+          <a:p>
+            <a:pPr algn="ctr"/>
+            <a:endParaRPr lang="en-US"/>
+          </a:p>
+        </p:txBody>
+      </p:sp>
+      <p:sp>
+        <p:nvSpPr>
+          <p:cNvPr id="13" name="Arrow: Left 12">
+            <a:extLst>
+              <a:ext uri="{FF2B5EF4-FFF2-40B4-BE49-F238E27FC236}">
+                <a16:creationId xmlns:a16="http://schemas.microsoft.com/office/drawing/2014/main" id="{28416BA9-053B-71EC-7E73-D113CE7A68AF}"/>
+              </a:ext>
+            </a:extLst>
+          </p:cNvPr>
+          <p:cNvSpPr/>
+          <p:nvPr/>
+        </p:nvSpPr>
+        <p:spPr>
+          <a:xfrm rot="20050465">
+            <a:off x="10609162" y="4606015"/>
+            <a:ext cx="616068" cy="348776"/>
+          </a:xfrm>
+          <a:prstGeom prst="leftArrow">
+            <a:avLst>
+              <a:gd name="adj1" fmla="val 40480"/>
+              <a:gd name="adj2" fmla="val 50000"/>
+            </a:avLst>
+          </a:prstGeom>
+        </p:spPr>
+        <p:style>
+          <a:lnRef idx="2">
+            <a:schemeClr val="accent1">
+              <a:shade val="50000"/>
+            </a:schemeClr>
+          </a:lnRef>
+          <a:fillRef idx="1">
+            <a:schemeClr val="accent1"/>
+          </a:fillRef>
+          <a:effectRef idx="0">
+            <a:schemeClr val="accent1"/>
+          </a:effectRef>
+          <a:fontRef idx="minor">
+            <a:schemeClr val="lt1"/>
+          </a:fontRef>
+        </p:style>
+        <p:txBody>
+          <a:bodyPr rtlCol="0" anchor="ctr"/>
+          <a:lstStyle/>
+          <a:p>
+            <a:pPr algn="ctr"/>
+            <a:endParaRPr lang="en-US"/>
+          </a:p>
+        </p:txBody>
+      </p:sp>
+      <p:sp>
+        <p:nvSpPr>
+          <p:cNvPr id="14" name="Arrow: Left 13">
+            <a:extLst>
+              <a:ext uri="{FF2B5EF4-FFF2-40B4-BE49-F238E27FC236}">
+                <a16:creationId xmlns:a16="http://schemas.microsoft.com/office/drawing/2014/main" id="{76D06F09-E463-ADEE-7111-04F8C6F0C742}"/>
+              </a:ext>
+            </a:extLst>
+          </p:cNvPr>
+          <p:cNvSpPr/>
+          <p:nvPr/>
+        </p:nvSpPr>
+        <p:spPr>
+          <a:xfrm rot="20050465">
+            <a:off x="4415609" y="2896927"/>
+            <a:ext cx="791868" cy="370811"/>
+          </a:xfrm>
+          <a:prstGeom prst="leftArrow">
+            <a:avLst>
+              <a:gd name="adj1" fmla="val 40480"/>
+              <a:gd name="adj2" fmla="val 50000"/>
+            </a:avLst>
+          </a:prstGeom>
+        </p:spPr>
+        <p:style>
+          <a:lnRef idx="2">
+            <a:schemeClr val="accent1">
+              <a:shade val="50000"/>
+            </a:schemeClr>
+          </a:lnRef>
+          <a:fillRef idx="1">
+            <a:schemeClr val="accent1"/>
+          </a:fillRef>
+          <a:effectRef idx="0">
+            <a:schemeClr val="accent1"/>
+          </a:effectRef>
+          <a:fontRef idx="minor">
+            <a:schemeClr val="lt1"/>
+          </a:fontRef>
+        </p:style>
+        <p:txBody>
+          <a:bodyPr rtlCol="0" anchor="ctr"/>
+          <a:lstStyle/>
+          <a:p>
+            <a:pPr algn="ctr"/>
             <a:endParaRPr lang="en-US"/>
           </a:p>
         </p:txBody>
@@ -7298,7 +8834,7 @@
     </p:spTree>
     <p:extLst>
       <p:ext uri="{BB962C8B-B14F-4D97-AF65-F5344CB8AC3E}">
-        <p14:creationId xmlns:p14="http://schemas.microsoft.com/office/powerpoint/2010/main" val="3601657205"/>
+        <p14:creationId xmlns:p14="http://schemas.microsoft.com/office/powerpoint/2010/main" val="3040043632"/>
       </p:ext>
     </p:extLst>
   </p:cSld>
@@ -7348,7 +8884,7 @@
           <a:p>
             <a:r>
               <a:rPr lang="en-US" dirty="0"/>
-              <a:t>Model 1 – K-Prototypes</a:t>
+              <a:t>Data Pre-Processing</a:t>
             </a:r>
           </a:p>
         </p:txBody>
@@ -7369,19 +8905,1006 @@
             <p:ph idx="1"/>
           </p:nvPr>
         </p:nvSpPr>
-        <p:spPr/>
+        <p:spPr>
+          <a:xfrm>
+            <a:off x="646111" y="1378084"/>
+            <a:ext cx="8946541" cy="4195481"/>
+          </a:xfrm>
+        </p:spPr>
         <p:txBody>
           <a:bodyPr/>
           <a:lstStyle/>
           <a:p>
-            <a:endParaRPr lang="en-US"/>
-          </a:p>
-        </p:txBody>
-      </p:sp>
+            <a:r>
+              <a:rPr lang="en-US" dirty="0"/>
+              <a:t>GOAL: Make data usable for models</a:t>
+            </a:r>
+          </a:p>
+          <a:p>
+            <a:r>
+              <a:rPr lang="en-US" dirty="0"/>
+              <a:t>Remove -&gt; “Model”: Too sparse</a:t>
+            </a:r>
+          </a:p>
+          <a:p>
+            <a:r>
+              <a:rPr lang="en-US" dirty="0"/>
+              <a:t>Impute -&gt; display size and processor gen</a:t>
+            </a:r>
+          </a:p>
+          <a:p>
+            <a:r>
+              <a:rPr lang="en-US" dirty="0" err="1"/>
+              <a:t>MinMaxScaler</a:t>
+            </a:r>
+            <a:r>
+              <a:rPr lang="en-US" dirty="0"/>
+              <a:t> with our numerical data</a:t>
+            </a:r>
+          </a:p>
+          <a:p>
+            <a:pPr marL="0" indent="0">
+              <a:buNone/>
+            </a:pPr>
+            <a:r>
+              <a:rPr lang="en-US" dirty="0"/>
+              <a:t>	</a:t>
+            </a:r>
+          </a:p>
+          <a:p>
+            <a:r>
+              <a:rPr lang="en-US" dirty="0"/>
+              <a:t>Dummy encode categorical data</a:t>
+            </a:r>
+          </a:p>
+        </p:txBody>
+      </p:sp>
+      <p:graphicFrame>
+        <p:nvGraphicFramePr>
+          <p:cNvPr id="8" name="Table 8">
+            <a:extLst>
+              <a:ext uri="{FF2B5EF4-FFF2-40B4-BE49-F238E27FC236}">
+                <a16:creationId xmlns:a16="http://schemas.microsoft.com/office/drawing/2014/main" id="{F7EF27D7-20A5-5E0A-08DA-B814A2F5DD70}"/>
+              </a:ext>
+            </a:extLst>
+          </p:cNvPr>
+          <p:cNvGraphicFramePr>
+            <a:graphicFrameLocks noGrp="1"/>
+          </p:cNvGraphicFramePr>
+          <p:nvPr>
+            <p:extLst>
+              <p:ext uri="{D42A27DB-BD31-4B8C-83A1-F6EECF244321}">
+                <p14:modId xmlns:p14="http://schemas.microsoft.com/office/powerpoint/2010/main" val="486089117"/>
+              </p:ext>
+            </p:extLst>
+          </p:nvPr>
+        </p:nvGraphicFramePr>
+        <p:xfrm>
+          <a:off x="1111158" y="3993405"/>
+          <a:ext cx="10280706" cy="457200"/>
+        </p:xfrm>
+        <a:graphic>
+          <a:graphicData uri="http://schemas.openxmlformats.org/drawingml/2006/table">
+            <a:tbl>
+              <a:tblPr firstRow="1">
+                <a:tableStyleId>{21E4AEA4-8DFA-4A89-87EB-49C32662AFE0}</a:tableStyleId>
+              </a:tblPr>
+              <a:tblGrid>
+                <a:gridCol w="1027299">
+                  <a:extLst>
+                    <a:ext uri="{9D8B030D-6E8A-4147-A177-3AD203B41FA5}">
+                      <a16:colId xmlns:a16="http://schemas.microsoft.com/office/drawing/2014/main" val="2890747123"/>
+                    </a:ext>
+                  </a:extLst>
+                </a:gridCol>
+                <a:gridCol w="1027299">
+                  <a:extLst>
+                    <a:ext uri="{9D8B030D-6E8A-4147-A177-3AD203B41FA5}">
+                      <a16:colId xmlns:a16="http://schemas.microsoft.com/office/drawing/2014/main" val="2788587778"/>
+                    </a:ext>
+                  </a:extLst>
+                </a:gridCol>
+                <a:gridCol w="1027299">
+                  <a:extLst>
+                    <a:ext uri="{9D8B030D-6E8A-4147-A177-3AD203B41FA5}">
+                      <a16:colId xmlns:a16="http://schemas.microsoft.com/office/drawing/2014/main" val="2779452997"/>
+                    </a:ext>
+                  </a:extLst>
+                </a:gridCol>
+                <a:gridCol w="1027299">
+                  <a:extLst>
+                    <a:ext uri="{9D8B030D-6E8A-4147-A177-3AD203B41FA5}">
+                      <a16:colId xmlns:a16="http://schemas.microsoft.com/office/drawing/2014/main" val="3282330231"/>
+                    </a:ext>
+                  </a:extLst>
+                </a:gridCol>
+                <a:gridCol w="1027299">
+                  <a:extLst>
+                    <a:ext uri="{9D8B030D-6E8A-4147-A177-3AD203B41FA5}">
+                      <a16:colId xmlns:a16="http://schemas.microsoft.com/office/drawing/2014/main" val="879456958"/>
+                    </a:ext>
+                  </a:extLst>
+                </a:gridCol>
+                <a:gridCol w="1027299">
+                  <a:extLst>
+                    <a:ext uri="{9D8B030D-6E8A-4147-A177-3AD203B41FA5}">
+                      <a16:colId xmlns:a16="http://schemas.microsoft.com/office/drawing/2014/main" val="1260867525"/>
+                    </a:ext>
+                  </a:extLst>
+                </a:gridCol>
+                <a:gridCol w="1027299">
+                  <a:extLst>
+                    <a:ext uri="{9D8B030D-6E8A-4147-A177-3AD203B41FA5}">
+                      <a16:colId xmlns:a16="http://schemas.microsoft.com/office/drawing/2014/main" val="2906014126"/>
+                    </a:ext>
+                  </a:extLst>
+                </a:gridCol>
+                <a:gridCol w="1027299">
+                  <a:extLst>
+                    <a:ext uri="{9D8B030D-6E8A-4147-A177-3AD203B41FA5}">
+                      <a16:colId xmlns:a16="http://schemas.microsoft.com/office/drawing/2014/main" val="551583705"/>
+                    </a:ext>
+                  </a:extLst>
+                </a:gridCol>
+                <a:gridCol w="1027299">
+                  <a:extLst>
+                    <a:ext uri="{9D8B030D-6E8A-4147-A177-3AD203B41FA5}">
+                      <a16:colId xmlns:a16="http://schemas.microsoft.com/office/drawing/2014/main" val="4242146955"/>
+                    </a:ext>
+                  </a:extLst>
+                </a:gridCol>
+                <a:gridCol w="1035015">
+                  <a:extLst>
+                    <a:ext uri="{9D8B030D-6E8A-4147-A177-3AD203B41FA5}">
+                      <a16:colId xmlns:a16="http://schemas.microsoft.com/office/drawing/2014/main" val="778833871"/>
+                    </a:ext>
+                  </a:extLst>
+                </a:gridCol>
+              </a:tblGrid>
+              <a:tr h="370840">
+                <a:tc>
+                  <a:txBody>
+                    <a:bodyPr/>
+                    <a:lstStyle/>
+                    <a:p>
+                      <a:r>
+                        <a:rPr lang="en-US" sz="1200" dirty="0"/>
+                        <a:t>Brand</a:t>
+                      </a:r>
+                    </a:p>
+                  </a:txBody>
+                  <a:tcPr>
+                    <a:lnL w="12700" cmpd="sng">
+                      <a:noFill/>
+                    </a:lnL>
+                    <a:lnR w="12700" cap="flat" cmpd="sng" algn="ctr">
+                      <a:solidFill>
+                        <a:schemeClr val="tx1"/>
+                      </a:solidFill>
+                      <a:prstDash val="solid"/>
+                      <a:round/>
+                      <a:headEnd type="none" w="med" len="med"/>
+                      <a:tailEnd type="none" w="med" len="med"/>
+                    </a:lnR>
+                    <a:lnT w="12700" cmpd="sng">
+                      <a:noFill/>
+                    </a:lnT>
+                    <a:lnB w="38100" cmpd="sng">
+                      <a:noFill/>
+                    </a:lnB>
+                    <a:lnTlToBr w="12700" cmpd="sng">
+                      <a:noFill/>
+                      <a:prstDash val="solid"/>
+                    </a:lnTlToBr>
+                    <a:lnBlToTr w="12700" cmpd="sng">
+                      <a:noFill/>
+                      <a:prstDash val="solid"/>
+                    </a:lnBlToTr>
+                  </a:tcPr>
+                </a:tc>
+                <a:tc>
+                  <a:txBody>
+                    <a:bodyPr/>
+                    <a:lstStyle/>
+                    <a:p>
+                      <a:r>
+                        <a:rPr lang="en-US" sz="1200" dirty="0"/>
+                        <a:t>Processor Brand</a:t>
+                      </a:r>
+                    </a:p>
+                  </a:txBody>
+                  <a:tcPr>
+                    <a:lnL w="12700" cap="flat" cmpd="sng" algn="ctr">
+                      <a:solidFill>
+                        <a:schemeClr val="tx1"/>
+                      </a:solidFill>
+                      <a:prstDash val="solid"/>
+                      <a:round/>
+                      <a:headEnd type="none" w="med" len="med"/>
+                      <a:tailEnd type="none" w="med" len="med"/>
+                    </a:lnL>
+                    <a:lnR w="12700" cap="flat" cmpd="sng" algn="ctr">
+                      <a:solidFill>
+                        <a:schemeClr val="tx1"/>
+                      </a:solidFill>
+                      <a:prstDash val="solid"/>
+                      <a:round/>
+                      <a:headEnd type="none" w="med" len="med"/>
+                      <a:tailEnd type="none" w="med" len="med"/>
+                    </a:lnR>
+                    <a:lnT w="12700" cmpd="sng">
+                      <a:noFill/>
+                    </a:lnT>
+                    <a:lnB w="38100" cmpd="sng">
+                      <a:noFill/>
+                    </a:lnB>
+                    <a:lnTlToBr w="12700" cmpd="sng">
+                      <a:noFill/>
+                      <a:prstDash val="solid"/>
+                    </a:lnTlToBr>
+                    <a:lnBlToTr w="12700" cmpd="sng">
+                      <a:noFill/>
+                      <a:prstDash val="solid"/>
+                    </a:lnBlToTr>
+                  </a:tcPr>
+                </a:tc>
+                <a:tc>
+                  <a:txBody>
+                    <a:bodyPr/>
+                    <a:lstStyle/>
+                    <a:p>
+                      <a:r>
+                        <a:rPr lang="en-US" sz="1200" dirty="0"/>
+                        <a:t>Processor Name</a:t>
+                      </a:r>
+                    </a:p>
+                  </a:txBody>
+                  <a:tcPr>
+                    <a:lnL w="12700" cap="flat" cmpd="sng" algn="ctr">
+                      <a:solidFill>
+                        <a:schemeClr val="tx1"/>
+                      </a:solidFill>
+                      <a:prstDash val="solid"/>
+                      <a:round/>
+                      <a:headEnd type="none" w="med" len="med"/>
+                      <a:tailEnd type="none" w="med" len="med"/>
+                    </a:lnL>
+                    <a:lnR w="12700" cap="flat" cmpd="sng" algn="ctr">
+                      <a:solidFill>
+                        <a:schemeClr val="tx1"/>
+                      </a:solidFill>
+                      <a:prstDash val="solid"/>
+                      <a:round/>
+                      <a:headEnd type="none" w="med" len="med"/>
+                      <a:tailEnd type="none" w="med" len="med"/>
+                    </a:lnR>
+                    <a:lnT w="12700" cmpd="sng">
+                      <a:noFill/>
+                    </a:lnT>
+                    <a:lnB w="38100" cmpd="sng">
+                      <a:noFill/>
+                    </a:lnB>
+                    <a:lnTlToBr w="12700" cmpd="sng">
+                      <a:noFill/>
+                      <a:prstDash val="solid"/>
+                    </a:lnTlToBr>
+                    <a:lnBlToTr w="12700" cmpd="sng">
+                      <a:noFill/>
+                      <a:prstDash val="solid"/>
+                    </a:lnBlToTr>
+                  </a:tcPr>
+                </a:tc>
+                <a:tc>
+                  <a:txBody>
+                    <a:bodyPr/>
+                    <a:lstStyle/>
+                    <a:p>
+                      <a:r>
+                        <a:rPr lang="en-US" sz="1200" dirty="0"/>
+                        <a:t>Processor Generation</a:t>
+                      </a:r>
+                    </a:p>
+                  </a:txBody>
+                  <a:tcPr>
+                    <a:lnL w="12700" cap="flat" cmpd="sng" algn="ctr">
+                      <a:solidFill>
+                        <a:schemeClr val="tx1"/>
+                      </a:solidFill>
+                      <a:prstDash val="solid"/>
+                      <a:round/>
+                      <a:headEnd type="none" w="med" len="med"/>
+                      <a:tailEnd type="none" w="med" len="med"/>
+                    </a:lnL>
+                    <a:lnR w="12700" cap="flat" cmpd="sng" algn="ctr">
+                      <a:solidFill>
+                        <a:schemeClr val="tx1"/>
+                      </a:solidFill>
+                      <a:prstDash val="solid"/>
+                      <a:round/>
+                      <a:headEnd type="none" w="med" len="med"/>
+                      <a:tailEnd type="none" w="med" len="med"/>
+                    </a:lnR>
+                    <a:lnT w="12700" cmpd="sng">
+                      <a:noFill/>
+                    </a:lnT>
+                    <a:lnB w="38100" cmpd="sng">
+                      <a:noFill/>
+                    </a:lnB>
+                    <a:lnTlToBr w="12700" cmpd="sng">
+                      <a:noFill/>
+                      <a:prstDash val="solid"/>
+                    </a:lnTlToBr>
+                    <a:lnBlToTr w="12700" cmpd="sng">
+                      <a:noFill/>
+                      <a:prstDash val="solid"/>
+                    </a:lnBlToTr>
+                  </a:tcPr>
+                </a:tc>
+                <a:tc>
+                  <a:txBody>
+                    <a:bodyPr/>
+                    <a:lstStyle/>
+                    <a:p>
+                      <a:r>
+                        <a:rPr lang="en-US" sz="1200" dirty="0"/>
+                        <a:t>RAM Type</a:t>
+                      </a:r>
+                    </a:p>
+                  </a:txBody>
+                  <a:tcPr>
+                    <a:lnL w="12700" cap="flat" cmpd="sng" algn="ctr">
+                      <a:solidFill>
+                        <a:schemeClr val="tx1"/>
+                      </a:solidFill>
+                      <a:prstDash val="solid"/>
+                      <a:round/>
+                      <a:headEnd type="none" w="med" len="med"/>
+                      <a:tailEnd type="none" w="med" len="med"/>
+                    </a:lnL>
+                    <a:lnR w="12700" cap="flat" cmpd="sng" algn="ctr">
+                      <a:solidFill>
+                        <a:schemeClr val="tx1"/>
+                      </a:solidFill>
+                      <a:prstDash val="solid"/>
+                      <a:round/>
+                      <a:headEnd type="none" w="med" len="med"/>
+                      <a:tailEnd type="none" w="med" len="med"/>
+                    </a:lnR>
+                    <a:lnT w="12700" cmpd="sng">
+                      <a:noFill/>
+                    </a:lnT>
+                    <a:lnB w="38100" cmpd="sng">
+                      <a:noFill/>
+                    </a:lnB>
+                    <a:lnTlToBr w="12700" cmpd="sng">
+                      <a:noFill/>
+                      <a:prstDash val="solid"/>
+                    </a:lnTlToBr>
+                    <a:lnBlToTr w="12700" cmpd="sng">
+                      <a:noFill/>
+                      <a:prstDash val="solid"/>
+                    </a:lnBlToTr>
+                  </a:tcPr>
+                </a:tc>
+                <a:tc>
+                  <a:txBody>
+                    <a:bodyPr/>
+                    <a:lstStyle/>
+                    <a:p>
+                      <a:r>
+                        <a:rPr lang="en-US" sz="1200" dirty="0"/>
+                        <a:t>OS</a:t>
+                      </a:r>
+                    </a:p>
+                  </a:txBody>
+                  <a:tcPr>
+                    <a:lnL w="12700" cap="flat" cmpd="sng" algn="ctr">
+                      <a:solidFill>
+                        <a:schemeClr val="tx1"/>
+                      </a:solidFill>
+                      <a:prstDash val="solid"/>
+                      <a:round/>
+                      <a:headEnd type="none" w="med" len="med"/>
+                      <a:tailEnd type="none" w="med" len="med"/>
+                    </a:lnL>
+                    <a:lnR w="12700" cap="flat" cmpd="sng" algn="ctr">
+                      <a:solidFill>
+                        <a:schemeClr val="tx1"/>
+                      </a:solidFill>
+                      <a:prstDash val="solid"/>
+                      <a:round/>
+                      <a:headEnd type="none" w="med" len="med"/>
+                      <a:tailEnd type="none" w="med" len="med"/>
+                    </a:lnR>
+                    <a:lnT w="12700" cmpd="sng">
+                      <a:noFill/>
+                    </a:lnT>
+                    <a:lnB w="38100" cmpd="sng">
+                      <a:noFill/>
+                    </a:lnB>
+                    <a:lnTlToBr w="12700" cmpd="sng">
+                      <a:noFill/>
+                      <a:prstDash val="solid"/>
+                    </a:lnTlToBr>
+                    <a:lnBlToTr w="12700" cmpd="sng">
+                      <a:noFill/>
+                      <a:prstDash val="solid"/>
+                    </a:lnBlToTr>
+                  </a:tcPr>
+                </a:tc>
+                <a:tc>
+                  <a:txBody>
+                    <a:bodyPr/>
+                    <a:lstStyle/>
+                    <a:p>
+                      <a:pPr marL="0" marR="0" lvl="0" indent="0" algn="l" defTabSz="457200" rtl="0" eaLnBrk="1" fontAlgn="auto" latinLnBrk="0" hangingPunct="1">
+                        <a:lnSpc>
+                          <a:spcPct val="100000"/>
+                        </a:lnSpc>
+                        <a:spcBef>
+                          <a:spcPts val="0"/>
+                        </a:spcBef>
+                        <a:spcAft>
+                          <a:spcPts val="0"/>
+                        </a:spcAft>
+                        <a:buClrTx/>
+                        <a:buSzTx/>
+                        <a:buFontTx/>
+                        <a:buNone/>
+                        <a:tabLst/>
+                        <a:defRPr/>
+                      </a:pPr>
+                      <a:r>
+                        <a:rPr lang="en-US" sz="1200" dirty="0"/>
+                        <a:t>OS BIT</a:t>
+                      </a:r>
+                    </a:p>
+                    <a:p>
+                      <a:endParaRPr lang="en-US" sz="1200" dirty="0"/>
+                    </a:p>
+                  </a:txBody>
+                  <a:tcPr>
+                    <a:lnL w="12700" cap="flat" cmpd="sng" algn="ctr">
+                      <a:solidFill>
+                        <a:schemeClr val="tx1"/>
+                      </a:solidFill>
+                      <a:prstDash val="solid"/>
+                      <a:round/>
+                      <a:headEnd type="none" w="med" len="med"/>
+                      <a:tailEnd type="none" w="med" len="med"/>
+                    </a:lnL>
+                    <a:lnR w="12700" cap="flat" cmpd="sng" algn="ctr">
+                      <a:solidFill>
+                        <a:schemeClr val="tx1"/>
+                      </a:solidFill>
+                      <a:prstDash val="solid"/>
+                      <a:round/>
+                      <a:headEnd type="none" w="med" len="med"/>
+                      <a:tailEnd type="none" w="med" len="med"/>
+                    </a:lnR>
+                    <a:lnT w="12700" cmpd="sng">
+                      <a:noFill/>
+                    </a:lnT>
+                    <a:lnB w="38100" cmpd="sng">
+                      <a:noFill/>
+                    </a:lnB>
+                    <a:lnTlToBr w="12700" cmpd="sng">
+                      <a:noFill/>
+                      <a:prstDash val="solid"/>
+                    </a:lnTlToBr>
+                    <a:lnBlToTr w="12700" cmpd="sng">
+                      <a:noFill/>
+                      <a:prstDash val="solid"/>
+                    </a:lnBlToTr>
+                  </a:tcPr>
+                </a:tc>
+                <a:tc>
+                  <a:txBody>
+                    <a:bodyPr/>
+                    <a:lstStyle/>
+                    <a:p>
+                      <a:r>
+                        <a:rPr lang="en-US" sz="1200" dirty="0"/>
+                        <a:t>Weight</a:t>
+                      </a:r>
+                    </a:p>
+                  </a:txBody>
+                  <a:tcPr>
+                    <a:lnL w="12700" cap="flat" cmpd="sng" algn="ctr">
+                      <a:solidFill>
+                        <a:schemeClr val="tx1"/>
+                      </a:solidFill>
+                      <a:prstDash val="solid"/>
+                      <a:round/>
+                      <a:headEnd type="none" w="med" len="med"/>
+                      <a:tailEnd type="none" w="med" len="med"/>
+                    </a:lnL>
+                    <a:lnR w="12700" cap="flat" cmpd="sng" algn="ctr">
+                      <a:solidFill>
+                        <a:schemeClr val="tx1"/>
+                      </a:solidFill>
+                      <a:prstDash val="solid"/>
+                      <a:round/>
+                      <a:headEnd type="none" w="med" len="med"/>
+                      <a:tailEnd type="none" w="med" len="med"/>
+                    </a:lnR>
+                    <a:lnT w="12700" cmpd="sng">
+                      <a:noFill/>
+                    </a:lnT>
+                    <a:lnB w="38100" cmpd="sng">
+                      <a:noFill/>
+                    </a:lnB>
+                    <a:lnTlToBr w="12700" cmpd="sng">
+                      <a:noFill/>
+                      <a:prstDash val="solid"/>
+                    </a:lnTlToBr>
+                    <a:lnBlToTr w="12700" cmpd="sng">
+                      <a:noFill/>
+                      <a:prstDash val="solid"/>
+                    </a:lnBlToTr>
+                  </a:tcPr>
+                </a:tc>
+                <a:tc>
+                  <a:txBody>
+                    <a:bodyPr/>
+                    <a:lstStyle/>
+                    <a:p>
+                      <a:r>
+                        <a:rPr lang="en-US" sz="1200" dirty="0"/>
+                        <a:t>MS Office</a:t>
+                      </a:r>
+                    </a:p>
+                  </a:txBody>
+                  <a:tcPr>
+                    <a:lnL w="12700" cap="flat" cmpd="sng" algn="ctr">
+                      <a:solidFill>
+                        <a:schemeClr val="tx1"/>
+                      </a:solidFill>
+                      <a:prstDash val="solid"/>
+                      <a:round/>
+                      <a:headEnd type="none" w="med" len="med"/>
+                      <a:tailEnd type="none" w="med" len="med"/>
+                    </a:lnL>
+                    <a:lnR w="12700" cap="flat" cmpd="sng" algn="ctr">
+                      <a:solidFill>
+                        <a:schemeClr val="tx1"/>
+                      </a:solidFill>
+                      <a:prstDash val="solid"/>
+                      <a:round/>
+                      <a:headEnd type="none" w="med" len="med"/>
+                      <a:tailEnd type="none" w="med" len="med"/>
+                    </a:lnR>
+                    <a:lnT w="12700" cmpd="sng">
+                      <a:noFill/>
+                    </a:lnT>
+                    <a:lnB w="38100" cmpd="sng">
+                      <a:noFill/>
+                    </a:lnB>
+                    <a:lnTlToBr w="12700" cmpd="sng">
+                      <a:noFill/>
+                      <a:prstDash val="solid"/>
+                    </a:lnTlToBr>
+                    <a:lnBlToTr w="12700" cmpd="sng">
+                      <a:noFill/>
+                      <a:prstDash val="solid"/>
+                    </a:lnBlToTr>
+                  </a:tcPr>
+                </a:tc>
+                <a:tc>
+                  <a:txBody>
+                    <a:bodyPr/>
+                    <a:lstStyle/>
+                    <a:p>
+                      <a:r>
+                        <a:rPr lang="en-US" sz="1200" dirty="0"/>
+                        <a:t>Binarize Warrant</a:t>
+                      </a:r>
+                    </a:p>
+                  </a:txBody>
+                  <a:tcPr>
+                    <a:lnL w="12700" cap="flat" cmpd="sng" algn="ctr">
+                      <a:solidFill>
+                        <a:schemeClr val="tx1"/>
+                      </a:solidFill>
+                      <a:prstDash val="solid"/>
+                      <a:round/>
+                      <a:headEnd type="none" w="med" len="med"/>
+                      <a:tailEnd type="none" w="med" len="med"/>
+                    </a:lnL>
+                    <a:lnR w="12700" cap="flat" cmpd="sng" algn="ctr">
+                      <a:solidFill>
+                        <a:schemeClr val="tx1"/>
+                      </a:solidFill>
+                      <a:prstDash val="solid"/>
+                      <a:round/>
+                      <a:headEnd type="none" w="med" len="med"/>
+                      <a:tailEnd type="none" w="med" len="med"/>
+                    </a:lnR>
+                    <a:lnT w="12700" cmpd="sng">
+                      <a:noFill/>
+                    </a:lnT>
+                    <a:lnB w="38100" cmpd="sng">
+                      <a:noFill/>
+                    </a:lnB>
+                    <a:lnTlToBr w="12700" cmpd="sng">
+                      <a:noFill/>
+                      <a:prstDash val="solid"/>
+                    </a:lnTlToBr>
+                    <a:lnBlToTr w="12700" cmpd="sng">
+                      <a:noFill/>
+                      <a:prstDash val="solid"/>
+                    </a:lnBlToTr>
+                  </a:tcPr>
+                </a:tc>
+                <a:extLst>
+                  <a:ext uri="{0D108BD9-81ED-4DB2-BD59-A6C34878D82A}">
+                    <a16:rowId xmlns:a16="http://schemas.microsoft.com/office/drawing/2014/main" val="780752697"/>
+                  </a:ext>
+                </a:extLst>
+              </a:tr>
+            </a:tbl>
+          </a:graphicData>
+        </a:graphic>
+      </p:graphicFrame>
+      <p:graphicFrame>
+        <p:nvGraphicFramePr>
+          <p:cNvPr id="9" name="Table 8">
+            <a:extLst>
+              <a:ext uri="{FF2B5EF4-FFF2-40B4-BE49-F238E27FC236}">
+                <a16:creationId xmlns:a16="http://schemas.microsoft.com/office/drawing/2014/main" id="{611E52C2-5189-2CEF-9865-2D53227CCD20}"/>
+              </a:ext>
+            </a:extLst>
+          </p:cNvPr>
+          <p:cNvGraphicFramePr>
+            <a:graphicFrameLocks noGrp="1"/>
+          </p:cNvGraphicFramePr>
+          <p:nvPr>
+            <p:extLst>
+              <p:ext uri="{D42A27DB-BD31-4B8C-83A1-F6EECF244321}">
+                <p14:modId xmlns:p14="http://schemas.microsoft.com/office/powerpoint/2010/main" val="2155145140"/>
+              </p:ext>
+            </p:extLst>
+          </p:nvPr>
+        </p:nvGraphicFramePr>
+        <p:xfrm>
+          <a:off x="1111158" y="3148904"/>
+          <a:ext cx="9969684" cy="376335"/>
+        </p:xfrm>
+        <a:graphic>
+          <a:graphicData uri="http://schemas.openxmlformats.org/drawingml/2006/table">
+            <a:tbl>
+              <a:tblPr firstRow="1">
+                <a:tableStyleId>{21E4AEA4-8DFA-4A89-87EB-49C32662AFE0}</a:tableStyleId>
+              </a:tblPr>
+              <a:tblGrid>
+                <a:gridCol w="1661614">
+                  <a:extLst>
+                    <a:ext uri="{9D8B030D-6E8A-4147-A177-3AD203B41FA5}">
+                      <a16:colId xmlns:a16="http://schemas.microsoft.com/office/drawing/2014/main" val="2890747123"/>
+                    </a:ext>
+                  </a:extLst>
+                </a:gridCol>
+                <a:gridCol w="1661614">
+                  <a:extLst>
+                    <a:ext uri="{9D8B030D-6E8A-4147-A177-3AD203B41FA5}">
+                      <a16:colId xmlns:a16="http://schemas.microsoft.com/office/drawing/2014/main" val="2788587778"/>
+                    </a:ext>
+                  </a:extLst>
+                </a:gridCol>
+                <a:gridCol w="1661614">
+                  <a:extLst>
+                    <a:ext uri="{9D8B030D-6E8A-4147-A177-3AD203B41FA5}">
+                      <a16:colId xmlns:a16="http://schemas.microsoft.com/office/drawing/2014/main" val="2779452997"/>
+                    </a:ext>
+                  </a:extLst>
+                </a:gridCol>
+                <a:gridCol w="1661614">
+                  <a:extLst>
+                    <a:ext uri="{9D8B030D-6E8A-4147-A177-3AD203B41FA5}">
+                      <a16:colId xmlns:a16="http://schemas.microsoft.com/office/drawing/2014/main" val="3282330231"/>
+                    </a:ext>
+                  </a:extLst>
+                </a:gridCol>
+                <a:gridCol w="1661614">
+                  <a:extLst>
+                    <a:ext uri="{9D8B030D-6E8A-4147-A177-3AD203B41FA5}">
+                      <a16:colId xmlns:a16="http://schemas.microsoft.com/office/drawing/2014/main" val="879456958"/>
+                    </a:ext>
+                  </a:extLst>
+                </a:gridCol>
+                <a:gridCol w="1661614">
+                  <a:extLst>
+                    <a:ext uri="{9D8B030D-6E8A-4147-A177-3AD203B41FA5}">
+                      <a16:colId xmlns:a16="http://schemas.microsoft.com/office/drawing/2014/main" val="1260867525"/>
+                    </a:ext>
+                  </a:extLst>
+                </a:gridCol>
+              </a:tblGrid>
+              <a:tr h="376335">
+                <a:tc>
+                  <a:txBody>
+                    <a:bodyPr/>
+                    <a:lstStyle/>
+                    <a:p>
+                      <a:r>
+                        <a:rPr lang="en-US" sz="1200" dirty="0"/>
+                        <a:t>RAM GB</a:t>
+                      </a:r>
+                    </a:p>
+                  </a:txBody>
+                  <a:tcPr>
+                    <a:lnL w="12700" cmpd="sng">
+                      <a:noFill/>
+                    </a:lnL>
+                    <a:lnR w="12700" cap="flat" cmpd="sng" algn="ctr">
+                      <a:solidFill>
+                        <a:schemeClr val="tx1"/>
+                      </a:solidFill>
+                      <a:prstDash val="solid"/>
+                      <a:round/>
+                      <a:headEnd type="none" w="med" len="med"/>
+                      <a:tailEnd type="none" w="med" len="med"/>
+                    </a:lnR>
+                    <a:lnT w="12700" cmpd="sng">
+                      <a:noFill/>
+                    </a:lnT>
+                    <a:lnB w="38100" cmpd="sng">
+                      <a:noFill/>
+                    </a:lnB>
+                    <a:lnTlToBr w="12700" cmpd="sng">
+                      <a:noFill/>
+                      <a:prstDash val="solid"/>
+                    </a:lnTlToBr>
+                    <a:lnBlToTr w="12700" cmpd="sng">
+                      <a:noFill/>
+                      <a:prstDash val="solid"/>
+                    </a:lnBlToTr>
+                  </a:tcPr>
+                </a:tc>
+                <a:tc>
+                  <a:txBody>
+                    <a:bodyPr/>
+                    <a:lstStyle/>
+                    <a:p>
+                      <a:r>
+                        <a:rPr lang="en-US" sz="1200" dirty="0"/>
+                        <a:t>SSD GB</a:t>
+                      </a:r>
+                    </a:p>
+                  </a:txBody>
+                  <a:tcPr>
+                    <a:lnL w="12700" cap="flat" cmpd="sng" algn="ctr">
+                      <a:solidFill>
+                        <a:schemeClr val="tx1"/>
+                      </a:solidFill>
+                      <a:prstDash val="solid"/>
+                      <a:round/>
+                      <a:headEnd type="none" w="med" len="med"/>
+                      <a:tailEnd type="none" w="med" len="med"/>
+                    </a:lnL>
+                    <a:lnR w="12700" cap="flat" cmpd="sng" algn="ctr">
+                      <a:solidFill>
+                        <a:schemeClr val="tx1"/>
+                      </a:solidFill>
+                      <a:prstDash val="solid"/>
+                      <a:round/>
+                      <a:headEnd type="none" w="med" len="med"/>
+                      <a:tailEnd type="none" w="med" len="med"/>
+                    </a:lnR>
+                    <a:lnT w="12700" cmpd="sng">
+                      <a:noFill/>
+                    </a:lnT>
+                    <a:lnB w="38100" cmpd="sng">
+                      <a:noFill/>
+                    </a:lnB>
+                    <a:lnTlToBr w="12700" cmpd="sng">
+                      <a:noFill/>
+                      <a:prstDash val="solid"/>
+                    </a:lnTlToBr>
+                    <a:lnBlToTr w="12700" cmpd="sng">
+                      <a:noFill/>
+                      <a:prstDash val="solid"/>
+                    </a:lnBlToTr>
+                  </a:tcPr>
+                </a:tc>
+                <a:tc>
+                  <a:txBody>
+                    <a:bodyPr/>
+                    <a:lstStyle/>
+                    <a:p>
+                      <a:r>
+                        <a:rPr lang="en-US" sz="1200" dirty="0"/>
+                        <a:t>HDD GB</a:t>
+                      </a:r>
+                    </a:p>
+                  </a:txBody>
+                  <a:tcPr>
+                    <a:lnL w="12700" cap="flat" cmpd="sng" algn="ctr">
+                      <a:solidFill>
+                        <a:schemeClr val="tx1"/>
+                      </a:solidFill>
+                      <a:prstDash val="solid"/>
+                      <a:round/>
+                      <a:headEnd type="none" w="med" len="med"/>
+                      <a:tailEnd type="none" w="med" len="med"/>
+                    </a:lnL>
+                    <a:lnR w="12700" cap="flat" cmpd="sng" algn="ctr">
+                      <a:solidFill>
+                        <a:schemeClr val="tx1"/>
+                      </a:solidFill>
+                      <a:prstDash val="solid"/>
+                      <a:round/>
+                      <a:headEnd type="none" w="med" len="med"/>
+                      <a:tailEnd type="none" w="med" len="med"/>
+                    </a:lnR>
+                    <a:lnT w="12700" cmpd="sng">
+                      <a:noFill/>
+                    </a:lnT>
+                    <a:lnB w="38100" cmpd="sng">
+                      <a:noFill/>
+                    </a:lnB>
+                    <a:lnTlToBr w="12700" cmpd="sng">
+                      <a:noFill/>
+                      <a:prstDash val="solid"/>
+                    </a:lnTlToBr>
+                    <a:lnBlToTr w="12700" cmpd="sng">
+                      <a:noFill/>
+                      <a:prstDash val="solid"/>
+                    </a:lnBlToTr>
+                  </a:tcPr>
+                </a:tc>
+                <a:tc>
+                  <a:txBody>
+                    <a:bodyPr/>
+                    <a:lstStyle/>
+                    <a:p>
+                      <a:r>
+                        <a:rPr lang="en-US" sz="1200" dirty="0"/>
+                        <a:t>Graphics Card GB</a:t>
+                      </a:r>
+                    </a:p>
+                  </a:txBody>
+                  <a:tcPr>
+                    <a:lnL w="12700" cap="flat" cmpd="sng" algn="ctr">
+                      <a:solidFill>
+                        <a:schemeClr val="tx1"/>
+                      </a:solidFill>
+                      <a:prstDash val="solid"/>
+                      <a:round/>
+                      <a:headEnd type="none" w="med" len="med"/>
+                      <a:tailEnd type="none" w="med" len="med"/>
+                    </a:lnL>
+                    <a:lnR w="12700" cap="flat" cmpd="sng" algn="ctr">
+                      <a:solidFill>
+                        <a:schemeClr val="tx1"/>
+                      </a:solidFill>
+                      <a:prstDash val="solid"/>
+                      <a:round/>
+                      <a:headEnd type="none" w="med" len="med"/>
+                      <a:tailEnd type="none" w="med" len="med"/>
+                    </a:lnR>
+                    <a:lnT w="12700" cmpd="sng">
+                      <a:noFill/>
+                    </a:lnT>
+                    <a:lnB w="38100" cmpd="sng">
+                      <a:noFill/>
+                    </a:lnB>
+                    <a:lnTlToBr w="12700" cmpd="sng">
+                      <a:noFill/>
+                      <a:prstDash val="solid"/>
+                    </a:lnTlToBr>
+                    <a:lnBlToTr w="12700" cmpd="sng">
+                      <a:noFill/>
+                      <a:prstDash val="solid"/>
+                    </a:lnBlToTr>
+                  </a:tcPr>
+                </a:tc>
+                <a:tc>
+                  <a:txBody>
+                    <a:bodyPr/>
+                    <a:lstStyle/>
+                    <a:p>
+                      <a:r>
+                        <a:rPr lang="en-US" sz="1200" dirty="0"/>
+                        <a:t>Display Size</a:t>
+                      </a:r>
+                    </a:p>
+                  </a:txBody>
+                  <a:tcPr>
+                    <a:lnL w="12700" cap="flat" cmpd="sng" algn="ctr">
+                      <a:solidFill>
+                        <a:schemeClr val="tx1"/>
+                      </a:solidFill>
+                      <a:prstDash val="solid"/>
+                      <a:round/>
+                      <a:headEnd type="none" w="med" len="med"/>
+                      <a:tailEnd type="none" w="med" len="med"/>
+                    </a:lnL>
+                    <a:lnR w="12700" cap="flat" cmpd="sng" algn="ctr">
+                      <a:solidFill>
+                        <a:schemeClr val="tx1"/>
+                      </a:solidFill>
+                      <a:prstDash val="solid"/>
+                      <a:round/>
+                      <a:headEnd type="none" w="med" len="med"/>
+                      <a:tailEnd type="none" w="med" len="med"/>
+                    </a:lnR>
+                    <a:lnT w="12700" cmpd="sng">
+                      <a:noFill/>
+                    </a:lnT>
+                    <a:lnB w="38100" cmpd="sng">
+                      <a:noFill/>
+                    </a:lnB>
+                    <a:lnTlToBr w="12700" cmpd="sng">
+                      <a:noFill/>
+                      <a:prstDash val="solid"/>
+                    </a:lnTlToBr>
+                    <a:lnBlToTr w="12700" cmpd="sng">
+                      <a:noFill/>
+                      <a:prstDash val="solid"/>
+                    </a:lnBlToTr>
+                  </a:tcPr>
+                </a:tc>
+                <a:tc>
+                  <a:txBody>
+                    <a:bodyPr/>
+                    <a:lstStyle/>
+                    <a:p>
+                      <a:r>
+                        <a:rPr lang="en-US" sz="1200" dirty="0"/>
+                        <a:t>Latest Price</a:t>
+                      </a:r>
+                    </a:p>
+                  </a:txBody>
+                  <a:tcPr>
+                    <a:lnL w="12700" cap="flat" cmpd="sng" algn="ctr">
+                      <a:solidFill>
+                        <a:schemeClr val="tx1"/>
+                      </a:solidFill>
+                      <a:prstDash val="solid"/>
+                      <a:round/>
+                      <a:headEnd type="none" w="med" len="med"/>
+                      <a:tailEnd type="none" w="med" len="med"/>
+                    </a:lnL>
+                    <a:lnR w="12700" cap="flat" cmpd="sng" algn="ctr">
+                      <a:solidFill>
+                        <a:schemeClr val="tx1"/>
+                      </a:solidFill>
+                      <a:prstDash val="solid"/>
+                      <a:round/>
+                      <a:headEnd type="none" w="med" len="med"/>
+                      <a:tailEnd type="none" w="med" len="med"/>
+                    </a:lnR>
+                    <a:lnT w="12700" cmpd="sng">
+                      <a:noFill/>
+                    </a:lnT>
+                    <a:lnB w="38100" cmpd="sng">
+                      <a:noFill/>
+                    </a:lnB>
+                    <a:lnTlToBr w="12700" cmpd="sng">
+                      <a:noFill/>
+                      <a:prstDash val="solid"/>
+                    </a:lnTlToBr>
+                    <a:lnBlToTr w="12700" cmpd="sng">
+                      <a:noFill/>
+                      <a:prstDash val="solid"/>
+                    </a:lnBlToTr>
+                  </a:tcPr>
+                </a:tc>
+                <a:extLst>
+                  <a:ext uri="{0D108BD9-81ED-4DB2-BD59-A6C34878D82A}">
+                    <a16:rowId xmlns:a16="http://schemas.microsoft.com/office/drawing/2014/main" val="780752697"/>
+                  </a:ext>
+                </a:extLst>
+              </a:tr>
+            </a:tbl>
+          </a:graphicData>
+        </a:graphic>
+      </p:graphicFrame>
     </p:spTree>
     <p:extLst>
       <p:ext uri="{BB962C8B-B14F-4D97-AF65-F5344CB8AC3E}">
-        <p14:creationId xmlns:p14="http://schemas.microsoft.com/office/powerpoint/2010/main" val="2141447545"/>
+        <p14:creationId xmlns:p14="http://schemas.microsoft.com/office/powerpoint/2010/main" val="3601657205"/>
       </p:ext>
     </p:extLst>
   </p:cSld>
@@ -7431,7 +9954,7 @@
           <a:p>
             <a:r>
               <a:rPr lang="en-US" dirty="0"/>
-              <a:t>Model 2 – Isomapping</a:t>
+              <a:t>Model 1 – K-Prototypes</a:t>
             </a:r>
           </a:p>
         </p:txBody>
@@ -7452,11 +9975,149 @@
             <p:ph idx="1"/>
           </p:nvPr>
         </p:nvSpPr>
-        <p:spPr/>
+        <p:spPr>
+          <a:xfrm>
+            <a:off x="748078" y="1245080"/>
+            <a:ext cx="8946541" cy="4195481"/>
+          </a:xfrm>
+        </p:spPr>
         <p:txBody>
           <a:bodyPr/>
           <a:lstStyle/>
           <a:p>
+            <a:r>
+              <a:rPr lang="en-US" dirty="0"/>
+              <a:t>12 Clusters seemed ideal</a:t>
+            </a:r>
+          </a:p>
+          <a:p>
+            <a:r>
+              <a:rPr lang="en-US" dirty="0"/>
+              <a:t>SHAP Analysis helped me understand the clustering breakdown</a:t>
+            </a:r>
+          </a:p>
+          <a:p>
+            <a:r>
+              <a:rPr lang="en-US" dirty="0"/>
+              <a:t>Cost of: 191.30 </a:t>
+            </a:r>
+          </a:p>
+          <a:p>
+            <a:r>
+              <a:rPr lang="en-US" dirty="0"/>
+              <a:t>F1 Score of: 0.79</a:t>
+            </a:r>
+          </a:p>
+        </p:txBody>
+      </p:sp>
+      <p:pic>
+        <p:nvPicPr>
+          <p:cNvPr id="5" name="Picture 4">
+            <a:extLst>
+              <a:ext uri="{FF2B5EF4-FFF2-40B4-BE49-F238E27FC236}">
+                <a16:creationId xmlns:a16="http://schemas.microsoft.com/office/drawing/2014/main" id="{404480C2-50FA-504E-1317-69475C09E071}"/>
+              </a:ext>
+            </a:extLst>
+          </p:cNvPr>
+          <p:cNvPicPr>
+            <a:picLocks noChangeAspect="1"/>
+          </p:cNvPicPr>
+          <p:nvPr/>
+        </p:nvPicPr>
+        <p:blipFill>
+          <a:blip r:embed="rId2"/>
+          <a:stretch>
+            <a:fillRect/>
+          </a:stretch>
+        </p:blipFill>
+        <p:spPr>
+          <a:xfrm>
+            <a:off x="984901" y="3123477"/>
+            <a:ext cx="3791479" cy="2676899"/>
+          </a:xfrm>
+          <a:prstGeom prst="rect">
+            <a:avLst/>
+          </a:prstGeom>
+        </p:spPr>
+      </p:pic>
+      <p:pic>
+        <p:nvPicPr>
+          <p:cNvPr id="7" name="Picture 6" descr="Chart, bar chart&#10;&#10;Description automatically generated">
+            <a:extLst>
+              <a:ext uri="{FF2B5EF4-FFF2-40B4-BE49-F238E27FC236}">
+                <a16:creationId xmlns:a16="http://schemas.microsoft.com/office/drawing/2014/main" id="{720E3C71-3EC7-6594-25F0-4762B4D8143A}"/>
+              </a:ext>
+            </a:extLst>
+          </p:cNvPr>
+          <p:cNvPicPr>
+            <a:picLocks noChangeAspect="1"/>
+          </p:cNvPicPr>
+          <p:nvPr/>
+        </p:nvPicPr>
+        <p:blipFill>
+          <a:blip r:embed="rId3">
+            <a:extLst>
+              <a:ext uri="{28A0092B-C50C-407E-A947-70E740481C1C}">
+                <a14:useLocalDpi xmlns:a14="http://schemas.microsoft.com/office/drawing/2010/main" val="0"/>
+              </a:ext>
+            </a:extLst>
+          </a:blip>
+          <a:stretch>
+            <a:fillRect/>
+          </a:stretch>
+        </p:blipFill>
+        <p:spPr>
+          <a:xfrm>
+            <a:off x="5221348" y="2512386"/>
+            <a:ext cx="6187476" cy="4109592"/>
+          </a:xfrm>
+          <a:prstGeom prst="rect">
+            <a:avLst/>
+          </a:prstGeom>
+        </p:spPr>
+      </p:pic>
+      <p:sp>
+        <p:nvSpPr>
+          <p:cNvPr id="8" name="Arrow: Down 7">
+            <a:extLst>
+              <a:ext uri="{FF2B5EF4-FFF2-40B4-BE49-F238E27FC236}">
+                <a16:creationId xmlns:a16="http://schemas.microsoft.com/office/drawing/2014/main" id="{2F7067AC-2364-E7CA-FE8A-9F0A36D7329F}"/>
+              </a:ext>
+            </a:extLst>
+          </p:cNvPr>
+          <p:cNvSpPr/>
+          <p:nvPr/>
+        </p:nvSpPr>
+        <p:spPr>
+          <a:xfrm>
+            <a:off x="3253273" y="4615543"/>
+            <a:ext cx="149290" cy="311020"/>
+          </a:xfrm>
+          <a:prstGeom prst="downArrow">
+            <a:avLst/>
+          </a:prstGeom>
+        </p:spPr>
+        <p:style>
+          <a:lnRef idx="2">
+            <a:schemeClr val="accent1">
+              <a:shade val="50000"/>
+            </a:schemeClr>
+          </a:lnRef>
+          <a:fillRef idx="1">
+            <a:schemeClr val="accent1"/>
+          </a:fillRef>
+          <a:effectRef idx="0">
+            <a:schemeClr val="accent1"/>
+          </a:effectRef>
+          <a:fontRef idx="minor">
+            <a:schemeClr val="lt1"/>
+          </a:fontRef>
+        </p:style>
+        <p:txBody>
+          <a:bodyPr rtlCol="0" anchor="ctr"/>
+          <a:lstStyle/>
+          <a:p>
+            <a:pPr algn="ctr"/>
             <a:endParaRPr lang="en-US"/>
           </a:p>
         </p:txBody>
@@ -7464,7 +10125,7 @@
     </p:spTree>
     <p:extLst>
       <p:ext uri="{BB962C8B-B14F-4D97-AF65-F5344CB8AC3E}">
-        <p14:creationId xmlns:p14="http://schemas.microsoft.com/office/powerpoint/2010/main" val="1346287030"/>
+        <p14:creationId xmlns:p14="http://schemas.microsoft.com/office/powerpoint/2010/main" val="2141447545"/>
       </p:ext>
     </p:extLst>
   </p:cSld>
@@ -7514,7 +10175,7 @@
           <a:p>
             <a:r>
               <a:rPr lang="en-US" dirty="0"/>
-              <a:t>Model 3 – XGBoost</a:t>
+              <a:t>Model 1 – K-Prototypes</a:t>
             </a:r>
           </a:p>
         </p:txBody>
@@ -7535,19 +10196,60 @@
             <p:ph idx="1"/>
           </p:nvPr>
         </p:nvSpPr>
-        <p:spPr/>
+        <p:spPr>
+          <a:xfrm>
+            <a:off x="748078" y="1245080"/>
+            <a:ext cx="8946541" cy="4195481"/>
+          </a:xfrm>
+        </p:spPr>
         <p:txBody>
           <a:bodyPr/>
           <a:lstStyle/>
           <a:p>
-            <a:endParaRPr lang="en-US"/>
-          </a:p>
-        </p:txBody>
-      </p:sp>
+            <a:r>
+              <a:rPr lang="en-US" dirty="0"/>
+              <a:t>Assessing the clusters:</a:t>
+            </a:r>
+          </a:p>
+          <a:p>
+            <a:endParaRPr lang="en-US" dirty="0"/>
+          </a:p>
+        </p:txBody>
+      </p:sp>
+      <p:pic>
+        <p:nvPicPr>
+          <p:cNvPr id="9" name="Picture 8">
+            <a:extLst>
+              <a:ext uri="{FF2B5EF4-FFF2-40B4-BE49-F238E27FC236}">
+                <a16:creationId xmlns:a16="http://schemas.microsoft.com/office/drawing/2014/main" id="{A4AFE35E-144A-574D-8DD7-D74358913AD1}"/>
+              </a:ext>
+            </a:extLst>
+          </p:cNvPr>
+          <p:cNvPicPr>
+            <a:picLocks noChangeAspect="1"/>
+          </p:cNvPicPr>
+          <p:nvPr/>
+        </p:nvPicPr>
+        <p:blipFill>
+          <a:blip r:embed="rId2"/>
+          <a:stretch>
+            <a:fillRect/>
+          </a:stretch>
+        </p:blipFill>
+        <p:spPr>
+          <a:xfrm>
+            <a:off x="1356651" y="1676591"/>
+            <a:ext cx="9478698" cy="3162741"/>
+          </a:xfrm>
+          <a:prstGeom prst="rect">
+            <a:avLst/>
+          </a:prstGeom>
+        </p:spPr>
+      </p:pic>
     </p:spTree>
     <p:extLst>
       <p:ext uri="{BB962C8B-B14F-4D97-AF65-F5344CB8AC3E}">
-        <p14:creationId xmlns:p14="http://schemas.microsoft.com/office/powerpoint/2010/main" val="248949725"/>
+        <p14:creationId xmlns:p14="http://schemas.microsoft.com/office/powerpoint/2010/main" val="856264219"/>
       </p:ext>
     </p:extLst>
   </p:cSld>

</xml_diff>